<commit_message>
fix the figure 2 to take less space
</commit_message>
<xml_diff>
--- a/figures/wot-scenario-source.pptx
+++ b/figures/wot-scenario-source.pptx
@@ -2,7 +2,7 @@
 <file path=ppt/presentation.xml><?xml version="1.0" encoding="utf-8"?>
 <p:presentation xmlns:a="http://schemas.openxmlformats.org/drawingml/2006/main" xmlns:r="http://schemas.openxmlformats.org/officeDocument/2006/relationships" xmlns:p="http://schemas.openxmlformats.org/presentationml/2006/main" saveSubsetFonts="1">
   <p:sldMasterIdLst>
-    <p:sldMasterId id="2147483660" r:id="rId1"/>
+    <p:sldMasterId id="2147483672" r:id="rId1"/>
   </p:sldMasterIdLst>
   <p:notesMasterIdLst>
     <p:notesMasterId r:id="rId3"/>
@@ -10,7 +10,7 @@
   <p:sldIdLst>
     <p:sldId id="257" r:id="rId2"/>
   </p:sldIdLst>
-  <p:sldSz cx="12192000" cy="6858000"/>
+  <p:sldSz cx="12192000" cy="5121275"/>
   <p:notesSz cx="6858000" cy="9144000"/>
   <p:defaultTextStyle>
     <a:defPPr>
@@ -107,6 +107,11 @@
       </a:defRPr>
     </a:lvl9pPr>
   </p:defaultTextStyle>
+  <p:extLst>
+    <p:ext uri="{EFAFB233-063F-42B5-8137-9DF3F51BA10A}">
+      <p15:sldGuideLst xmlns:p15="http://schemas.microsoft.com/office/powerpoint/2012/main"/>
+    </p:ext>
+  </p:extLst>
 </p:presentation>
 </file>
 
@@ -192,7 +197,7 @@
           <a:p>
             <a:fld id="{00E39959-6D4B-4E43-81FD-DD6A70473C6C}" type="datetimeFigureOut">
               <a:rPr lang="fi-FI" smtClean="0"/>
-              <a:t>20.11.2017</a:t>
+              <a:t>4.12.2017</a:t>
             </a:fld>
             <a:endParaRPr lang="fi-FI"/>
           </a:p>
@@ -210,8 +215,8 @@
         </p:nvSpPr>
         <p:spPr>
           <a:xfrm>
-            <a:off x="685800" y="1143000"/>
-            <a:ext cx="5486400" cy="3086100"/>
+            <a:off x="-242888" y="1143000"/>
+            <a:ext cx="7343776" cy="3086100"/>
           </a:xfrm>
           <a:prstGeom prst="rect">
             <a:avLst/>
@@ -487,7 +492,12 @@
             <p:ph type="sldImg"/>
           </p:nvPr>
         </p:nvSpPr>
-        <p:spPr/>
+        <p:spPr>
+          <a:xfrm>
+            <a:off x="-242888" y="1143000"/>
+            <a:ext cx="7343776" cy="3086100"/>
+          </a:xfrm>
+        </p:spPr>
       </p:sp>
       <p:sp>
         <p:nvSpPr>
@@ -573,15 +583,15 @@
         </p:nvSpPr>
         <p:spPr>
           <a:xfrm>
-            <a:off x="1524000" y="1122363"/>
-            <a:ext cx="9144000" cy="2387600"/>
+            <a:off x="1524000" y="838135"/>
+            <a:ext cx="9144000" cy="1782962"/>
           </a:xfrm>
         </p:spPr>
         <p:txBody>
           <a:bodyPr anchor="b"/>
           <a:lstStyle>
             <a:lvl1pPr algn="ctr">
-              <a:defRPr sz="4364"/>
+              <a:defRPr sz="4481"/>
             </a:lvl1pPr>
           </a:lstStyle>
           <a:p>
@@ -605,8 +615,8 @@
         </p:nvSpPr>
         <p:spPr>
           <a:xfrm>
-            <a:off x="1524000" y="3602038"/>
-            <a:ext cx="9144000" cy="1655762"/>
+            <a:off x="1524000" y="2689855"/>
+            <a:ext cx="9144000" cy="1236456"/>
           </a:xfrm>
         </p:spPr>
         <p:txBody>
@@ -614,39 +624,39 @@
           <a:lstStyle>
             <a:lvl1pPr marL="0" indent="0" algn="ctr">
               <a:buNone/>
-              <a:defRPr sz="1746"/>
+              <a:defRPr sz="1792"/>
             </a:lvl1pPr>
-            <a:lvl2pPr marL="332522" indent="0" algn="ctr">
+            <a:lvl2pPr marL="341437" indent="0" algn="ctr">
               <a:buNone/>
-              <a:defRPr sz="1455"/>
+              <a:defRPr sz="1494"/>
             </a:lvl2pPr>
-            <a:lvl3pPr marL="665043" indent="0" algn="ctr">
+            <a:lvl3pPr marL="682874" indent="0" algn="ctr">
               <a:buNone/>
-              <a:defRPr sz="1309"/>
+              <a:defRPr sz="1344"/>
             </a:lvl3pPr>
-            <a:lvl4pPr marL="997565" indent="0" algn="ctr">
+            <a:lvl4pPr marL="1024311" indent="0" algn="ctr">
               <a:buNone/>
-              <a:defRPr sz="1164"/>
+              <a:defRPr sz="1195"/>
             </a:lvl4pPr>
-            <a:lvl5pPr marL="1330086" indent="0" algn="ctr">
+            <a:lvl5pPr marL="1365748" indent="0" algn="ctr">
               <a:buNone/>
-              <a:defRPr sz="1164"/>
+              <a:defRPr sz="1195"/>
             </a:lvl5pPr>
-            <a:lvl6pPr marL="1662608" indent="0" algn="ctr">
+            <a:lvl6pPr marL="1707185" indent="0" algn="ctr">
               <a:buNone/>
-              <a:defRPr sz="1164"/>
+              <a:defRPr sz="1195"/>
             </a:lvl6pPr>
-            <a:lvl7pPr marL="1995129" indent="0" algn="ctr">
+            <a:lvl7pPr marL="2048622" indent="0" algn="ctr">
               <a:buNone/>
-              <a:defRPr sz="1164"/>
+              <a:defRPr sz="1195"/>
             </a:lvl7pPr>
-            <a:lvl8pPr marL="2327651" indent="0" algn="ctr">
+            <a:lvl8pPr marL="2390059" indent="0" algn="ctr">
               <a:buNone/>
-              <a:defRPr sz="1164"/>
+              <a:defRPr sz="1195"/>
             </a:lvl8pPr>
-            <a:lvl9pPr marL="2660172" indent="0" algn="ctr">
+            <a:lvl9pPr marL="2731496" indent="0" algn="ctr">
               <a:buNone/>
-              <a:defRPr sz="1164"/>
+              <a:defRPr sz="1195"/>
             </a:lvl9pPr>
           </a:lstStyle>
           <a:p>
@@ -682,7 +692,7 @@
                 </a:solidFill>
               </a:rPr>
               <a:pPr/>
-              <a:t>20.11.2017</a:t>
+              <a:t>4.12.2017</a:t>
             </a:fld>
             <a:endParaRPr lang="fi-FI">
               <a:solidFill>
@@ -758,7 +768,7 @@
     </p:spTree>
     <p:extLst>
       <p:ext uri="{BB962C8B-B14F-4D97-AF65-F5344CB8AC3E}">
-        <p14:creationId xmlns:p14="http://schemas.microsoft.com/office/powerpoint/2010/main" val="3268099285"/>
+        <p14:creationId xmlns:p14="http://schemas.microsoft.com/office/powerpoint/2010/main" val="3861533655"/>
       </p:ext>
     </p:extLst>
   </p:cSld>
@@ -884,7 +894,7 @@
                 </a:solidFill>
               </a:rPr>
               <a:pPr/>
-              <a:t>20.11.2017</a:t>
+              <a:t>4.12.2017</a:t>
             </a:fld>
             <a:endParaRPr lang="fi-FI">
               <a:solidFill>
@@ -960,7 +970,7 @@
     </p:spTree>
     <p:extLst>
       <p:ext uri="{BB962C8B-B14F-4D97-AF65-F5344CB8AC3E}">
-        <p14:creationId xmlns:p14="http://schemas.microsoft.com/office/powerpoint/2010/main" val="3495470819"/>
+        <p14:creationId xmlns:p14="http://schemas.microsoft.com/office/powerpoint/2010/main" val="345776286"/>
       </p:ext>
     </p:extLst>
   </p:cSld>
@@ -999,8 +1009,8 @@
         </p:nvSpPr>
         <p:spPr>
           <a:xfrm>
-            <a:off x="8724900" y="365125"/>
-            <a:ext cx="2628900" cy="5811838"/>
+            <a:off x="8724900" y="272660"/>
+            <a:ext cx="2628900" cy="4340044"/>
           </a:xfrm>
         </p:spPr>
         <p:txBody>
@@ -1027,8 +1037,8 @@
         </p:nvSpPr>
         <p:spPr>
           <a:xfrm>
-            <a:off x="838201" y="365125"/>
-            <a:ext cx="7734300" cy="5811838"/>
+            <a:off x="838200" y="272660"/>
+            <a:ext cx="7734300" cy="4340044"/>
           </a:xfrm>
         </p:spPr>
         <p:txBody>
@@ -1096,7 +1106,7 @@
                 </a:solidFill>
               </a:rPr>
               <a:pPr/>
-              <a:t>20.11.2017</a:t>
+              <a:t>4.12.2017</a:t>
             </a:fld>
             <a:endParaRPr lang="fi-FI">
               <a:solidFill>
@@ -1172,7 +1182,7 @@
     </p:spTree>
     <p:extLst>
       <p:ext uri="{BB962C8B-B14F-4D97-AF65-F5344CB8AC3E}">
-        <p14:creationId xmlns:p14="http://schemas.microsoft.com/office/powerpoint/2010/main" val="3090506934"/>
+        <p14:creationId xmlns:p14="http://schemas.microsoft.com/office/powerpoint/2010/main" val="1368055081"/>
       </p:ext>
     </p:extLst>
   </p:cSld>
@@ -1298,7 +1308,7 @@
                 </a:solidFill>
               </a:rPr>
               <a:pPr/>
-              <a:t>20.11.2017</a:t>
+              <a:t>4.12.2017</a:t>
             </a:fld>
             <a:endParaRPr lang="fi-FI">
               <a:solidFill>
@@ -1374,7 +1384,7 @@
     </p:spTree>
     <p:extLst>
       <p:ext uri="{BB962C8B-B14F-4D97-AF65-F5344CB8AC3E}">
-        <p14:creationId xmlns:p14="http://schemas.microsoft.com/office/powerpoint/2010/main" val="4164663992"/>
+        <p14:creationId xmlns:p14="http://schemas.microsoft.com/office/powerpoint/2010/main" val="2178288834"/>
       </p:ext>
     </p:extLst>
   </p:cSld>
@@ -1413,15 +1423,15 @@
         </p:nvSpPr>
         <p:spPr>
           <a:xfrm>
-            <a:off x="831850" y="1709740"/>
-            <a:ext cx="10515600" cy="2852737"/>
+            <a:off x="831850" y="1276763"/>
+            <a:ext cx="10515600" cy="2130308"/>
           </a:xfrm>
         </p:spPr>
         <p:txBody>
           <a:bodyPr anchor="b"/>
           <a:lstStyle>
             <a:lvl1pPr>
-              <a:defRPr sz="4364"/>
+              <a:defRPr sz="4481"/>
             </a:lvl1pPr>
           </a:lstStyle>
           <a:p>
@@ -1445,8 +1455,8 @@
         </p:nvSpPr>
         <p:spPr>
           <a:xfrm>
-            <a:off x="831850" y="4589465"/>
-            <a:ext cx="10515600" cy="1500187"/>
+            <a:off x="831850" y="3427224"/>
+            <a:ext cx="10515600" cy="1120279"/>
           </a:xfrm>
         </p:spPr>
         <p:txBody>
@@ -1454,7 +1464,7 @@
           <a:lstStyle>
             <a:lvl1pPr marL="0" indent="0">
               <a:buNone/>
-              <a:defRPr sz="1746">
+              <a:defRPr sz="1792">
                 <a:solidFill>
                   <a:schemeClr val="tx1">
                     <a:tint val="75000"/>
@@ -1462,9 +1472,9 @@
                 </a:solidFill>
               </a:defRPr>
             </a:lvl1pPr>
-            <a:lvl2pPr marL="332522" indent="0">
+            <a:lvl2pPr marL="341437" indent="0">
               <a:buNone/>
-              <a:defRPr sz="1455">
+              <a:defRPr sz="1494">
                 <a:solidFill>
                   <a:schemeClr val="tx1">
                     <a:tint val="75000"/>
@@ -1472,9 +1482,9 @@
                 </a:solidFill>
               </a:defRPr>
             </a:lvl2pPr>
-            <a:lvl3pPr marL="665043" indent="0">
+            <a:lvl3pPr marL="682874" indent="0">
               <a:buNone/>
-              <a:defRPr sz="1309">
+              <a:defRPr sz="1344">
                 <a:solidFill>
                   <a:schemeClr val="tx1">
                     <a:tint val="75000"/>
@@ -1482,9 +1492,9 @@
                 </a:solidFill>
               </a:defRPr>
             </a:lvl3pPr>
-            <a:lvl4pPr marL="997565" indent="0">
+            <a:lvl4pPr marL="1024311" indent="0">
               <a:buNone/>
-              <a:defRPr sz="1164">
+              <a:defRPr sz="1195">
                 <a:solidFill>
                   <a:schemeClr val="tx1">
                     <a:tint val="75000"/>
@@ -1492,9 +1502,9 @@
                 </a:solidFill>
               </a:defRPr>
             </a:lvl4pPr>
-            <a:lvl5pPr marL="1330086" indent="0">
+            <a:lvl5pPr marL="1365748" indent="0">
               <a:buNone/>
-              <a:defRPr sz="1164">
+              <a:defRPr sz="1195">
                 <a:solidFill>
                   <a:schemeClr val="tx1">
                     <a:tint val="75000"/>
@@ -1502,9 +1512,9 @@
                 </a:solidFill>
               </a:defRPr>
             </a:lvl5pPr>
-            <a:lvl6pPr marL="1662608" indent="0">
+            <a:lvl6pPr marL="1707185" indent="0">
               <a:buNone/>
-              <a:defRPr sz="1164">
+              <a:defRPr sz="1195">
                 <a:solidFill>
                   <a:schemeClr val="tx1">
                     <a:tint val="75000"/>
@@ -1512,9 +1522,9 @@
                 </a:solidFill>
               </a:defRPr>
             </a:lvl6pPr>
-            <a:lvl7pPr marL="1995129" indent="0">
+            <a:lvl7pPr marL="2048622" indent="0">
               <a:buNone/>
-              <a:defRPr sz="1164">
+              <a:defRPr sz="1195">
                 <a:solidFill>
                   <a:schemeClr val="tx1">
                     <a:tint val="75000"/>
@@ -1522,9 +1532,9 @@
                 </a:solidFill>
               </a:defRPr>
             </a:lvl7pPr>
-            <a:lvl8pPr marL="2327651" indent="0">
+            <a:lvl8pPr marL="2390059" indent="0">
               <a:buNone/>
-              <a:defRPr sz="1164">
+              <a:defRPr sz="1195">
                 <a:solidFill>
                   <a:schemeClr val="tx1">
                     <a:tint val="75000"/>
@@ -1532,9 +1542,9 @@
                 </a:solidFill>
               </a:defRPr>
             </a:lvl8pPr>
-            <a:lvl9pPr marL="2660172" indent="0">
+            <a:lvl9pPr marL="2731496" indent="0">
               <a:buNone/>
-              <a:defRPr sz="1164">
+              <a:defRPr sz="1195">
                 <a:solidFill>
                   <a:schemeClr val="tx1">
                     <a:tint val="75000"/>
@@ -1576,7 +1586,7 @@
                 </a:solidFill>
               </a:rPr>
               <a:pPr/>
-              <a:t>20.11.2017</a:t>
+              <a:t>4.12.2017</a:t>
             </a:fld>
             <a:endParaRPr lang="fi-FI">
               <a:solidFill>
@@ -1652,7 +1662,7 @@
     </p:spTree>
     <p:extLst>
       <p:ext uri="{BB962C8B-B14F-4D97-AF65-F5344CB8AC3E}">
-        <p14:creationId xmlns:p14="http://schemas.microsoft.com/office/powerpoint/2010/main" val="1385367450"/>
+        <p14:creationId xmlns:p14="http://schemas.microsoft.com/office/powerpoint/2010/main" val="2999673811"/>
       </p:ext>
     </p:extLst>
   </p:cSld>
@@ -1714,8 +1724,8 @@
         </p:nvSpPr>
         <p:spPr>
           <a:xfrm>
-            <a:off x="838200" y="1825625"/>
-            <a:ext cx="5181600" cy="4351338"/>
+            <a:off x="838200" y="1363302"/>
+            <a:ext cx="5181600" cy="3249402"/>
           </a:xfrm>
         </p:spPr>
         <p:txBody>
@@ -1771,8 +1781,8 @@
         </p:nvSpPr>
         <p:spPr>
           <a:xfrm>
-            <a:off x="6172200" y="1825625"/>
-            <a:ext cx="5181600" cy="4351338"/>
+            <a:off x="6172200" y="1363302"/>
+            <a:ext cx="5181600" cy="3249402"/>
           </a:xfrm>
         </p:spPr>
         <p:txBody>
@@ -1840,7 +1850,7 @@
                 </a:solidFill>
               </a:rPr>
               <a:pPr/>
-              <a:t>20.11.2017</a:t>
+              <a:t>4.12.2017</a:t>
             </a:fld>
             <a:endParaRPr lang="fi-FI">
               <a:solidFill>
@@ -1916,7 +1926,7 @@
     </p:spTree>
     <p:extLst>
       <p:ext uri="{BB962C8B-B14F-4D97-AF65-F5344CB8AC3E}">
-        <p14:creationId xmlns:p14="http://schemas.microsoft.com/office/powerpoint/2010/main" val="3808003313"/>
+        <p14:creationId xmlns:p14="http://schemas.microsoft.com/office/powerpoint/2010/main" val="2229342520"/>
       </p:ext>
     </p:extLst>
   </p:cSld>
@@ -1955,8 +1965,8 @@
         </p:nvSpPr>
         <p:spPr>
           <a:xfrm>
-            <a:off x="839788" y="365127"/>
-            <a:ext cx="10515600" cy="1325563"/>
+            <a:off x="839788" y="272661"/>
+            <a:ext cx="10515600" cy="989876"/>
           </a:xfrm>
         </p:spPr>
         <p:txBody>
@@ -1983,8 +1993,8 @@
         </p:nvSpPr>
         <p:spPr>
           <a:xfrm>
-            <a:off x="839789" y="1681163"/>
-            <a:ext cx="5157787" cy="823912"/>
+            <a:off x="839789" y="1255424"/>
+            <a:ext cx="5157787" cy="615264"/>
           </a:xfrm>
         </p:spPr>
         <p:txBody>
@@ -1992,39 +2002,39 @@
           <a:lstStyle>
             <a:lvl1pPr marL="0" indent="0">
               <a:buNone/>
-              <a:defRPr sz="1746" b="1"/>
+              <a:defRPr sz="1792" b="1"/>
             </a:lvl1pPr>
-            <a:lvl2pPr marL="332522" indent="0">
+            <a:lvl2pPr marL="341437" indent="0">
               <a:buNone/>
-              <a:defRPr sz="1455" b="1"/>
+              <a:defRPr sz="1494" b="1"/>
             </a:lvl2pPr>
-            <a:lvl3pPr marL="665043" indent="0">
+            <a:lvl3pPr marL="682874" indent="0">
               <a:buNone/>
-              <a:defRPr sz="1309" b="1"/>
+              <a:defRPr sz="1344" b="1"/>
             </a:lvl3pPr>
-            <a:lvl4pPr marL="997565" indent="0">
+            <a:lvl4pPr marL="1024311" indent="0">
               <a:buNone/>
-              <a:defRPr sz="1164" b="1"/>
+              <a:defRPr sz="1195" b="1"/>
             </a:lvl4pPr>
-            <a:lvl5pPr marL="1330086" indent="0">
+            <a:lvl5pPr marL="1365748" indent="0">
               <a:buNone/>
-              <a:defRPr sz="1164" b="1"/>
+              <a:defRPr sz="1195" b="1"/>
             </a:lvl5pPr>
-            <a:lvl6pPr marL="1662608" indent="0">
+            <a:lvl6pPr marL="1707185" indent="0">
               <a:buNone/>
-              <a:defRPr sz="1164" b="1"/>
+              <a:defRPr sz="1195" b="1"/>
             </a:lvl6pPr>
-            <a:lvl7pPr marL="1995129" indent="0">
+            <a:lvl7pPr marL="2048622" indent="0">
               <a:buNone/>
-              <a:defRPr sz="1164" b="1"/>
+              <a:defRPr sz="1195" b="1"/>
             </a:lvl7pPr>
-            <a:lvl8pPr marL="2327651" indent="0">
+            <a:lvl8pPr marL="2390059" indent="0">
               <a:buNone/>
-              <a:defRPr sz="1164" b="1"/>
+              <a:defRPr sz="1195" b="1"/>
             </a:lvl8pPr>
-            <a:lvl9pPr marL="2660172" indent="0">
+            <a:lvl9pPr marL="2731496" indent="0">
               <a:buNone/>
-              <a:defRPr sz="1164" b="1"/>
+              <a:defRPr sz="1195" b="1"/>
             </a:lvl9pPr>
           </a:lstStyle>
           <a:p>
@@ -2048,8 +2058,8 @@
         </p:nvSpPr>
         <p:spPr>
           <a:xfrm>
-            <a:off x="839789" y="2505075"/>
-            <a:ext cx="5157787" cy="3684588"/>
+            <a:off x="839789" y="1870688"/>
+            <a:ext cx="5157787" cy="2751500"/>
           </a:xfrm>
         </p:spPr>
         <p:txBody>
@@ -2105,8 +2115,8 @@
         </p:nvSpPr>
         <p:spPr>
           <a:xfrm>
-            <a:off x="6172200" y="1681163"/>
-            <a:ext cx="5183188" cy="823912"/>
+            <a:off x="6172200" y="1255424"/>
+            <a:ext cx="5183188" cy="615264"/>
           </a:xfrm>
         </p:spPr>
         <p:txBody>
@@ -2114,39 +2124,39 @@
           <a:lstStyle>
             <a:lvl1pPr marL="0" indent="0">
               <a:buNone/>
-              <a:defRPr sz="1746" b="1"/>
+              <a:defRPr sz="1792" b="1"/>
             </a:lvl1pPr>
-            <a:lvl2pPr marL="332522" indent="0">
+            <a:lvl2pPr marL="341437" indent="0">
               <a:buNone/>
-              <a:defRPr sz="1455" b="1"/>
+              <a:defRPr sz="1494" b="1"/>
             </a:lvl2pPr>
-            <a:lvl3pPr marL="665043" indent="0">
+            <a:lvl3pPr marL="682874" indent="0">
               <a:buNone/>
-              <a:defRPr sz="1309" b="1"/>
+              <a:defRPr sz="1344" b="1"/>
             </a:lvl3pPr>
-            <a:lvl4pPr marL="997565" indent="0">
+            <a:lvl4pPr marL="1024311" indent="0">
               <a:buNone/>
-              <a:defRPr sz="1164" b="1"/>
+              <a:defRPr sz="1195" b="1"/>
             </a:lvl4pPr>
-            <a:lvl5pPr marL="1330086" indent="0">
+            <a:lvl5pPr marL="1365748" indent="0">
               <a:buNone/>
-              <a:defRPr sz="1164" b="1"/>
+              <a:defRPr sz="1195" b="1"/>
             </a:lvl5pPr>
-            <a:lvl6pPr marL="1662608" indent="0">
+            <a:lvl6pPr marL="1707185" indent="0">
               <a:buNone/>
-              <a:defRPr sz="1164" b="1"/>
+              <a:defRPr sz="1195" b="1"/>
             </a:lvl6pPr>
-            <a:lvl7pPr marL="1995129" indent="0">
+            <a:lvl7pPr marL="2048622" indent="0">
               <a:buNone/>
-              <a:defRPr sz="1164" b="1"/>
+              <a:defRPr sz="1195" b="1"/>
             </a:lvl7pPr>
-            <a:lvl8pPr marL="2327651" indent="0">
+            <a:lvl8pPr marL="2390059" indent="0">
               <a:buNone/>
-              <a:defRPr sz="1164" b="1"/>
+              <a:defRPr sz="1195" b="1"/>
             </a:lvl8pPr>
-            <a:lvl9pPr marL="2660172" indent="0">
+            <a:lvl9pPr marL="2731496" indent="0">
               <a:buNone/>
-              <a:defRPr sz="1164" b="1"/>
+              <a:defRPr sz="1195" b="1"/>
             </a:lvl9pPr>
           </a:lstStyle>
           <a:p>
@@ -2170,8 +2180,8 @@
         </p:nvSpPr>
         <p:spPr>
           <a:xfrm>
-            <a:off x="6172200" y="2505075"/>
-            <a:ext cx="5183188" cy="3684588"/>
+            <a:off x="6172200" y="1870688"/>
+            <a:ext cx="5183188" cy="2751500"/>
           </a:xfrm>
         </p:spPr>
         <p:txBody>
@@ -2239,7 +2249,7 @@
                 </a:solidFill>
               </a:rPr>
               <a:pPr/>
-              <a:t>20.11.2017</a:t>
+              <a:t>4.12.2017</a:t>
             </a:fld>
             <a:endParaRPr lang="fi-FI">
               <a:solidFill>
@@ -2315,7 +2325,7 @@
     </p:spTree>
     <p:extLst>
       <p:ext uri="{BB962C8B-B14F-4D97-AF65-F5344CB8AC3E}">
-        <p14:creationId xmlns:p14="http://schemas.microsoft.com/office/powerpoint/2010/main" val="3713351913"/>
+        <p14:creationId xmlns:p14="http://schemas.microsoft.com/office/powerpoint/2010/main" val="1479396753"/>
       </p:ext>
     </p:extLst>
   </p:cSld>
@@ -2389,7 +2399,7 @@
                 </a:solidFill>
               </a:rPr>
               <a:pPr/>
-              <a:t>20.11.2017</a:t>
+              <a:t>4.12.2017</a:t>
             </a:fld>
             <a:endParaRPr lang="fi-FI">
               <a:solidFill>
@@ -2465,7 +2475,7 @@
     </p:spTree>
     <p:extLst>
       <p:ext uri="{BB962C8B-B14F-4D97-AF65-F5344CB8AC3E}">
-        <p14:creationId xmlns:p14="http://schemas.microsoft.com/office/powerpoint/2010/main" val="261076902"/>
+        <p14:creationId xmlns:p14="http://schemas.microsoft.com/office/powerpoint/2010/main" val="3955754289"/>
       </p:ext>
     </p:extLst>
   </p:cSld>
@@ -2516,7 +2526,7 @@
                 </a:solidFill>
               </a:rPr>
               <a:pPr/>
-              <a:t>20.11.2017</a:t>
+              <a:t>4.12.2017</a:t>
             </a:fld>
             <a:endParaRPr lang="fi-FI">
               <a:solidFill>
@@ -2592,7 +2602,7 @@
     </p:spTree>
     <p:extLst>
       <p:ext uri="{BB962C8B-B14F-4D97-AF65-F5344CB8AC3E}">
-        <p14:creationId xmlns:p14="http://schemas.microsoft.com/office/powerpoint/2010/main" val="3157775038"/>
+        <p14:creationId xmlns:p14="http://schemas.microsoft.com/office/powerpoint/2010/main" val="2009961711"/>
       </p:ext>
     </p:extLst>
   </p:cSld>
@@ -2631,15 +2641,15 @@
         </p:nvSpPr>
         <p:spPr>
           <a:xfrm>
-            <a:off x="839788" y="457200"/>
-            <a:ext cx="3932237" cy="1600200"/>
+            <a:off x="839789" y="341418"/>
+            <a:ext cx="3932237" cy="1194964"/>
           </a:xfrm>
         </p:spPr>
         <p:txBody>
           <a:bodyPr anchor="b"/>
           <a:lstStyle>
             <a:lvl1pPr>
-              <a:defRPr sz="2327"/>
+              <a:defRPr sz="2390"/>
             </a:lvl1pPr>
           </a:lstStyle>
           <a:p>
@@ -2663,39 +2673,39 @@
         </p:nvSpPr>
         <p:spPr>
           <a:xfrm>
-            <a:off x="5183189" y="987427"/>
-            <a:ext cx="6172200" cy="4873625"/>
+            <a:off x="5183188" y="737369"/>
+            <a:ext cx="6172200" cy="3639425"/>
           </a:xfrm>
         </p:spPr>
         <p:txBody>
           <a:bodyPr/>
           <a:lstStyle>
             <a:lvl1pPr>
-              <a:defRPr sz="2327"/>
+              <a:defRPr sz="2390"/>
             </a:lvl1pPr>
             <a:lvl2pPr>
-              <a:defRPr sz="2036"/>
+              <a:defRPr sz="2091"/>
             </a:lvl2pPr>
             <a:lvl3pPr>
-              <a:defRPr sz="1746"/>
+              <a:defRPr sz="1792"/>
             </a:lvl3pPr>
             <a:lvl4pPr>
-              <a:defRPr sz="1455"/>
+              <a:defRPr sz="1494"/>
             </a:lvl4pPr>
             <a:lvl5pPr>
-              <a:defRPr sz="1455"/>
+              <a:defRPr sz="1494"/>
             </a:lvl5pPr>
             <a:lvl6pPr>
-              <a:defRPr sz="1455"/>
+              <a:defRPr sz="1494"/>
             </a:lvl6pPr>
             <a:lvl7pPr>
-              <a:defRPr sz="1455"/>
+              <a:defRPr sz="1494"/>
             </a:lvl7pPr>
             <a:lvl8pPr>
-              <a:defRPr sz="1455"/>
+              <a:defRPr sz="1494"/>
             </a:lvl8pPr>
             <a:lvl9pPr>
-              <a:defRPr sz="1455"/>
+              <a:defRPr sz="1494"/>
             </a:lvl9pPr>
           </a:lstStyle>
           <a:p>
@@ -2748,8 +2758,8 @@
         </p:nvSpPr>
         <p:spPr>
           <a:xfrm>
-            <a:off x="839788" y="2057400"/>
-            <a:ext cx="3932237" cy="3811588"/>
+            <a:off x="839789" y="1536382"/>
+            <a:ext cx="3932237" cy="2846339"/>
           </a:xfrm>
         </p:spPr>
         <p:txBody>
@@ -2757,39 +2767,39 @@
           <a:lstStyle>
             <a:lvl1pPr marL="0" indent="0">
               <a:buNone/>
-              <a:defRPr sz="1164"/>
+              <a:defRPr sz="1195"/>
             </a:lvl1pPr>
-            <a:lvl2pPr marL="332522" indent="0">
+            <a:lvl2pPr marL="341437" indent="0">
               <a:buNone/>
-              <a:defRPr sz="1018"/>
+              <a:defRPr sz="1046"/>
             </a:lvl2pPr>
-            <a:lvl3pPr marL="665043" indent="0">
+            <a:lvl3pPr marL="682874" indent="0">
               <a:buNone/>
-              <a:defRPr sz="873"/>
+              <a:defRPr sz="896"/>
             </a:lvl3pPr>
-            <a:lvl4pPr marL="997565" indent="0">
+            <a:lvl4pPr marL="1024311" indent="0">
               <a:buNone/>
-              <a:defRPr sz="727"/>
+              <a:defRPr sz="747"/>
             </a:lvl4pPr>
-            <a:lvl5pPr marL="1330086" indent="0">
+            <a:lvl5pPr marL="1365748" indent="0">
               <a:buNone/>
-              <a:defRPr sz="727"/>
+              <a:defRPr sz="747"/>
             </a:lvl5pPr>
-            <a:lvl6pPr marL="1662608" indent="0">
+            <a:lvl6pPr marL="1707185" indent="0">
               <a:buNone/>
-              <a:defRPr sz="727"/>
+              <a:defRPr sz="747"/>
             </a:lvl6pPr>
-            <a:lvl7pPr marL="1995129" indent="0">
+            <a:lvl7pPr marL="2048622" indent="0">
               <a:buNone/>
-              <a:defRPr sz="727"/>
+              <a:defRPr sz="747"/>
             </a:lvl7pPr>
-            <a:lvl8pPr marL="2327651" indent="0">
+            <a:lvl8pPr marL="2390059" indent="0">
               <a:buNone/>
-              <a:defRPr sz="727"/>
+              <a:defRPr sz="747"/>
             </a:lvl8pPr>
-            <a:lvl9pPr marL="2660172" indent="0">
+            <a:lvl9pPr marL="2731496" indent="0">
               <a:buNone/>
-              <a:defRPr sz="727"/>
+              <a:defRPr sz="747"/>
             </a:lvl9pPr>
           </a:lstStyle>
           <a:p>
@@ -2825,7 +2835,7 @@
                 </a:solidFill>
               </a:rPr>
               <a:pPr/>
-              <a:t>20.11.2017</a:t>
+              <a:t>4.12.2017</a:t>
             </a:fld>
             <a:endParaRPr lang="fi-FI">
               <a:solidFill>
@@ -2901,7 +2911,7 @@
     </p:spTree>
     <p:extLst>
       <p:ext uri="{BB962C8B-B14F-4D97-AF65-F5344CB8AC3E}">
-        <p14:creationId xmlns:p14="http://schemas.microsoft.com/office/powerpoint/2010/main" val="3786554073"/>
+        <p14:creationId xmlns:p14="http://schemas.microsoft.com/office/powerpoint/2010/main" val="2250363931"/>
       </p:ext>
     </p:extLst>
   </p:cSld>
@@ -2940,15 +2950,15 @@
         </p:nvSpPr>
         <p:spPr>
           <a:xfrm>
-            <a:off x="839788" y="457200"/>
-            <a:ext cx="3932237" cy="1600200"/>
+            <a:off x="839789" y="341418"/>
+            <a:ext cx="3932237" cy="1194964"/>
           </a:xfrm>
         </p:spPr>
         <p:txBody>
           <a:bodyPr anchor="b"/>
           <a:lstStyle>
             <a:lvl1pPr>
-              <a:defRPr sz="2327"/>
+              <a:defRPr sz="2390"/>
             </a:lvl1pPr>
           </a:lstStyle>
           <a:p>
@@ -2972,8 +2982,8 @@
         </p:nvSpPr>
         <p:spPr>
           <a:xfrm>
-            <a:off x="5183189" y="987427"/>
-            <a:ext cx="6172200" cy="4873625"/>
+            <a:off x="5183188" y="737369"/>
+            <a:ext cx="6172200" cy="3639425"/>
           </a:xfrm>
         </p:spPr>
         <p:txBody>
@@ -2981,39 +2991,39 @@
           <a:lstStyle>
             <a:lvl1pPr marL="0" indent="0">
               <a:buNone/>
-              <a:defRPr sz="2327"/>
+              <a:defRPr sz="2390"/>
             </a:lvl1pPr>
-            <a:lvl2pPr marL="332522" indent="0">
+            <a:lvl2pPr marL="341437" indent="0">
               <a:buNone/>
-              <a:defRPr sz="2036"/>
+              <a:defRPr sz="2091"/>
             </a:lvl2pPr>
-            <a:lvl3pPr marL="665043" indent="0">
+            <a:lvl3pPr marL="682874" indent="0">
               <a:buNone/>
-              <a:defRPr sz="1746"/>
+              <a:defRPr sz="1792"/>
             </a:lvl3pPr>
-            <a:lvl4pPr marL="997565" indent="0">
+            <a:lvl4pPr marL="1024311" indent="0">
               <a:buNone/>
-              <a:defRPr sz="1455"/>
+              <a:defRPr sz="1494"/>
             </a:lvl4pPr>
-            <a:lvl5pPr marL="1330086" indent="0">
+            <a:lvl5pPr marL="1365748" indent="0">
               <a:buNone/>
-              <a:defRPr sz="1455"/>
+              <a:defRPr sz="1494"/>
             </a:lvl5pPr>
-            <a:lvl6pPr marL="1662608" indent="0">
+            <a:lvl6pPr marL="1707185" indent="0">
               <a:buNone/>
-              <a:defRPr sz="1455"/>
+              <a:defRPr sz="1494"/>
             </a:lvl6pPr>
-            <a:lvl7pPr marL="1995129" indent="0">
+            <a:lvl7pPr marL="2048622" indent="0">
               <a:buNone/>
-              <a:defRPr sz="1455"/>
+              <a:defRPr sz="1494"/>
             </a:lvl7pPr>
-            <a:lvl8pPr marL="2327651" indent="0">
+            <a:lvl8pPr marL="2390059" indent="0">
               <a:buNone/>
-              <a:defRPr sz="1455"/>
+              <a:defRPr sz="1494"/>
             </a:lvl8pPr>
-            <a:lvl9pPr marL="2660172" indent="0">
+            <a:lvl9pPr marL="2731496" indent="0">
               <a:buNone/>
-              <a:defRPr sz="1455"/>
+              <a:defRPr sz="1494"/>
             </a:lvl9pPr>
           </a:lstStyle>
           <a:p>
@@ -3037,8 +3047,8 @@
         </p:nvSpPr>
         <p:spPr>
           <a:xfrm>
-            <a:off x="839788" y="2057400"/>
-            <a:ext cx="3932237" cy="3811588"/>
+            <a:off x="839789" y="1536382"/>
+            <a:ext cx="3932237" cy="2846339"/>
           </a:xfrm>
         </p:spPr>
         <p:txBody>
@@ -3046,39 +3056,39 @@
           <a:lstStyle>
             <a:lvl1pPr marL="0" indent="0">
               <a:buNone/>
-              <a:defRPr sz="1164"/>
+              <a:defRPr sz="1195"/>
             </a:lvl1pPr>
-            <a:lvl2pPr marL="332522" indent="0">
+            <a:lvl2pPr marL="341437" indent="0">
               <a:buNone/>
-              <a:defRPr sz="1018"/>
+              <a:defRPr sz="1046"/>
             </a:lvl2pPr>
-            <a:lvl3pPr marL="665043" indent="0">
+            <a:lvl3pPr marL="682874" indent="0">
               <a:buNone/>
-              <a:defRPr sz="873"/>
+              <a:defRPr sz="896"/>
             </a:lvl3pPr>
-            <a:lvl4pPr marL="997565" indent="0">
+            <a:lvl4pPr marL="1024311" indent="0">
               <a:buNone/>
-              <a:defRPr sz="727"/>
+              <a:defRPr sz="747"/>
             </a:lvl4pPr>
-            <a:lvl5pPr marL="1330086" indent="0">
+            <a:lvl5pPr marL="1365748" indent="0">
               <a:buNone/>
-              <a:defRPr sz="727"/>
+              <a:defRPr sz="747"/>
             </a:lvl5pPr>
-            <a:lvl6pPr marL="1662608" indent="0">
+            <a:lvl6pPr marL="1707185" indent="0">
               <a:buNone/>
-              <a:defRPr sz="727"/>
+              <a:defRPr sz="747"/>
             </a:lvl6pPr>
-            <a:lvl7pPr marL="1995129" indent="0">
+            <a:lvl7pPr marL="2048622" indent="0">
               <a:buNone/>
-              <a:defRPr sz="727"/>
+              <a:defRPr sz="747"/>
             </a:lvl7pPr>
-            <a:lvl8pPr marL="2327651" indent="0">
+            <a:lvl8pPr marL="2390059" indent="0">
               <a:buNone/>
-              <a:defRPr sz="727"/>
+              <a:defRPr sz="747"/>
             </a:lvl8pPr>
-            <a:lvl9pPr marL="2660172" indent="0">
+            <a:lvl9pPr marL="2731496" indent="0">
               <a:buNone/>
-              <a:defRPr sz="727"/>
+              <a:defRPr sz="747"/>
             </a:lvl9pPr>
           </a:lstStyle>
           <a:p>
@@ -3114,7 +3124,7 @@
                 </a:solidFill>
               </a:rPr>
               <a:pPr/>
-              <a:t>20.11.2017</a:t>
+              <a:t>4.12.2017</a:t>
             </a:fld>
             <a:endParaRPr lang="fi-FI">
               <a:solidFill>
@@ -3190,7 +3200,7 @@
     </p:spTree>
     <p:extLst>
       <p:ext uri="{BB962C8B-B14F-4D97-AF65-F5344CB8AC3E}">
-        <p14:creationId xmlns:p14="http://schemas.microsoft.com/office/powerpoint/2010/main" val="3870553635"/>
+        <p14:creationId xmlns:p14="http://schemas.microsoft.com/office/powerpoint/2010/main" val="820841973"/>
       </p:ext>
     </p:extLst>
   </p:cSld>
@@ -3234,8 +3244,8 @@
         </p:nvSpPr>
         <p:spPr>
           <a:xfrm>
-            <a:off x="838200" y="365127"/>
-            <a:ext cx="10515600" cy="1325563"/>
+            <a:off x="838200" y="272661"/>
+            <a:ext cx="10515600" cy="989876"/>
           </a:xfrm>
           <a:prstGeom prst="rect">
             <a:avLst/>
@@ -3267,8 +3277,8 @@
         </p:nvSpPr>
         <p:spPr>
           <a:xfrm>
-            <a:off x="838200" y="1825625"/>
-            <a:ext cx="10515600" cy="4351338"/>
+            <a:off x="838200" y="1363302"/>
+            <a:ext cx="10515600" cy="3249402"/>
           </a:xfrm>
           <a:prstGeom prst="rect">
             <a:avLst/>
@@ -3329,8 +3339,8 @@
         </p:nvSpPr>
         <p:spPr>
           <a:xfrm>
-            <a:off x="838200" y="6356352"/>
-            <a:ext cx="2743200" cy="365125"/>
+            <a:off x="838200" y="4746664"/>
+            <a:ext cx="2743200" cy="272660"/>
           </a:xfrm>
           <a:prstGeom prst="rect">
             <a:avLst/>
@@ -3340,7 +3350,7 @@
           <a:bodyPr vert="horz" lIns="91440" tIns="45720" rIns="91440" bIns="45720" rtlCol="0" anchor="ctr"/>
           <a:lstStyle>
             <a:lvl1pPr algn="l">
-              <a:defRPr sz="873">
+              <a:defRPr sz="896">
                 <a:solidFill>
                   <a:schemeClr val="tx1">
                     <a:tint val="75000"/>
@@ -3359,7 +3369,7 @@
                 </a:solidFill>
               </a:rPr>
               <a:pPr/>
-              <a:t>20.11.2017</a:t>
+              <a:t>4.12.2017</a:t>
             </a:fld>
             <a:endParaRPr lang="fi-FI">
               <a:solidFill>
@@ -3383,8 +3393,8 @@
         </p:nvSpPr>
         <p:spPr>
           <a:xfrm>
-            <a:off x="4038600" y="6356352"/>
-            <a:ext cx="4114800" cy="365125"/>
+            <a:off x="4038600" y="4746664"/>
+            <a:ext cx="4114800" cy="272660"/>
           </a:xfrm>
           <a:prstGeom prst="rect">
             <a:avLst/>
@@ -3394,7 +3404,7 @@
           <a:bodyPr vert="horz" lIns="91440" tIns="45720" rIns="91440" bIns="45720" rtlCol="0" anchor="ctr"/>
           <a:lstStyle>
             <a:lvl1pPr algn="ctr">
-              <a:defRPr sz="873">
+              <a:defRPr sz="896">
                 <a:solidFill>
                   <a:schemeClr val="tx1">
                     <a:tint val="75000"/>
@@ -3426,8 +3436,8 @@
         </p:nvSpPr>
         <p:spPr>
           <a:xfrm>
-            <a:off x="8610600" y="6356352"/>
-            <a:ext cx="2743200" cy="365125"/>
+            <a:off x="8610600" y="4746664"/>
+            <a:ext cx="2743200" cy="272660"/>
           </a:xfrm>
           <a:prstGeom prst="rect">
             <a:avLst/>
@@ -3437,7 +3447,7 @@
           <a:bodyPr vert="horz" lIns="91440" tIns="45720" rIns="91440" bIns="45720" rtlCol="0" anchor="ctr"/>
           <a:lstStyle>
             <a:lvl1pPr algn="r">
-              <a:defRPr sz="873">
+              <a:defRPr sz="896">
                 <a:solidFill>
                   <a:schemeClr val="tx1">
                     <a:tint val="75000"/>
@@ -3471,27 +3481,27 @@
     </p:spTree>
     <p:extLst>
       <p:ext uri="{BB962C8B-B14F-4D97-AF65-F5344CB8AC3E}">
-        <p14:creationId xmlns:p14="http://schemas.microsoft.com/office/powerpoint/2010/main" val="3761041468"/>
+        <p14:creationId xmlns:p14="http://schemas.microsoft.com/office/powerpoint/2010/main" val="2504945103"/>
       </p:ext>
     </p:extLst>
   </p:cSld>
   <p:clrMap bg1="lt1" tx1="dk1" bg2="lt2" tx2="dk2" accent1="accent1" accent2="accent2" accent3="accent3" accent4="accent4" accent5="accent5" accent6="accent6" hlink="hlink" folHlink="folHlink"/>
   <p:sldLayoutIdLst>
-    <p:sldLayoutId id="2147483661" r:id="rId1"/>
-    <p:sldLayoutId id="2147483662" r:id="rId2"/>
-    <p:sldLayoutId id="2147483663" r:id="rId3"/>
-    <p:sldLayoutId id="2147483664" r:id="rId4"/>
-    <p:sldLayoutId id="2147483665" r:id="rId5"/>
-    <p:sldLayoutId id="2147483666" r:id="rId6"/>
-    <p:sldLayoutId id="2147483667" r:id="rId7"/>
-    <p:sldLayoutId id="2147483668" r:id="rId8"/>
-    <p:sldLayoutId id="2147483669" r:id="rId9"/>
-    <p:sldLayoutId id="2147483670" r:id="rId10"/>
-    <p:sldLayoutId id="2147483671" r:id="rId11"/>
+    <p:sldLayoutId id="2147483673" r:id="rId1"/>
+    <p:sldLayoutId id="2147483674" r:id="rId2"/>
+    <p:sldLayoutId id="2147483675" r:id="rId3"/>
+    <p:sldLayoutId id="2147483676" r:id="rId4"/>
+    <p:sldLayoutId id="2147483677" r:id="rId5"/>
+    <p:sldLayoutId id="2147483678" r:id="rId6"/>
+    <p:sldLayoutId id="2147483679" r:id="rId7"/>
+    <p:sldLayoutId id="2147483680" r:id="rId8"/>
+    <p:sldLayoutId id="2147483681" r:id="rId9"/>
+    <p:sldLayoutId id="2147483682" r:id="rId10"/>
+    <p:sldLayoutId id="2147483683" r:id="rId11"/>
   </p:sldLayoutIdLst>
   <p:txStyles>
     <p:titleStyle>
-      <a:lvl1pPr algn="l" defTabSz="665043" rtl="0" eaLnBrk="1" latinLnBrk="0" hangingPunct="1">
+      <a:lvl1pPr algn="l" defTabSz="682874" rtl="0" eaLnBrk="1" latinLnBrk="0" hangingPunct="1">
         <a:lnSpc>
           <a:spcPct val="90000"/>
         </a:lnSpc>
@@ -3499,7 +3509,7 @@
           <a:spcPct val="0"/>
         </a:spcBef>
         <a:buNone/>
-        <a:defRPr sz="3200" kern="1200">
+        <a:defRPr sz="3286" kern="1200">
           <a:solidFill>
             <a:schemeClr val="tx1"/>
           </a:solidFill>
@@ -3510,16 +3520,16 @@
       </a:lvl1pPr>
     </p:titleStyle>
     <p:bodyStyle>
-      <a:lvl1pPr marL="166261" indent="-166261" algn="l" defTabSz="665043" rtl="0" eaLnBrk="1" latinLnBrk="0" hangingPunct="1">
+      <a:lvl1pPr marL="170718" indent="-170718" algn="l" defTabSz="682874" rtl="0" eaLnBrk="1" latinLnBrk="0" hangingPunct="1">
         <a:lnSpc>
           <a:spcPct val="90000"/>
         </a:lnSpc>
         <a:spcBef>
-          <a:spcPts val="727"/>
+          <a:spcPts val="747"/>
         </a:spcBef>
         <a:buFont typeface="Arial" panose="020B0604020202020204" pitchFamily="34" charset="0"/>
         <a:buChar char="•"/>
-        <a:defRPr sz="2036" kern="1200">
+        <a:defRPr sz="2091" kern="1200">
           <a:solidFill>
             <a:schemeClr val="tx1"/>
           </a:solidFill>
@@ -3528,16 +3538,16 @@
           <a:cs typeface="+mn-cs"/>
         </a:defRPr>
       </a:lvl1pPr>
-      <a:lvl2pPr marL="498782" indent="-166261" algn="l" defTabSz="665043" rtl="0" eaLnBrk="1" latinLnBrk="0" hangingPunct="1">
+      <a:lvl2pPr marL="512155" indent="-170718" algn="l" defTabSz="682874" rtl="0" eaLnBrk="1" latinLnBrk="0" hangingPunct="1">
         <a:lnSpc>
           <a:spcPct val="90000"/>
         </a:lnSpc>
         <a:spcBef>
-          <a:spcPts val="364"/>
+          <a:spcPts val="373"/>
         </a:spcBef>
         <a:buFont typeface="Arial" panose="020B0604020202020204" pitchFamily="34" charset="0"/>
         <a:buChar char="•"/>
-        <a:defRPr sz="1746" kern="1200">
+        <a:defRPr sz="1792" kern="1200">
           <a:solidFill>
             <a:schemeClr val="tx1"/>
           </a:solidFill>
@@ -3546,16 +3556,16 @@
           <a:cs typeface="+mn-cs"/>
         </a:defRPr>
       </a:lvl2pPr>
-      <a:lvl3pPr marL="831304" indent="-166261" algn="l" defTabSz="665043" rtl="0" eaLnBrk="1" latinLnBrk="0" hangingPunct="1">
+      <a:lvl3pPr marL="853592" indent="-170718" algn="l" defTabSz="682874" rtl="0" eaLnBrk="1" latinLnBrk="0" hangingPunct="1">
         <a:lnSpc>
           <a:spcPct val="90000"/>
         </a:lnSpc>
         <a:spcBef>
-          <a:spcPts val="364"/>
+          <a:spcPts val="373"/>
         </a:spcBef>
         <a:buFont typeface="Arial" panose="020B0604020202020204" pitchFamily="34" charset="0"/>
         <a:buChar char="•"/>
-        <a:defRPr sz="1455" kern="1200">
+        <a:defRPr sz="1494" kern="1200">
           <a:solidFill>
             <a:schemeClr val="tx1"/>
           </a:solidFill>
@@ -3564,16 +3574,16 @@
           <a:cs typeface="+mn-cs"/>
         </a:defRPr>
       </a:lvl3pPr>
-      <a:lvl4pPr marL="1163825" indent="-166261" algn="l" defTabSz="665043" rtl="0" eaLnBrk="1" latinLnBrk="0" hangingPunct="1">
+      <a:lvl4pPr marL="1195029" indent="-170718" algn="l" defTabSz="682874" rtl="0" eaLnBrk="1" latinLnBrk="0" hangingPunct="1">
         <a:lnSpc>
           <a:spcPct val="90000"/>
         </a:lnSpc>
         <a:spcBef>
-          <a:spcPts val="364"/>
+          <a:spcPts val="373"/>
         </a:spcBef>
         <a:buFont typeface="Arial" panose="020B0604020202020204" pitchFamily="34" charset="0"/>
         <a:buChar char="•"/>
-        <a:defRPr sz="1309" kern="1200">
+        <a:defRPr sz="1344" kern="1200">
           <a:solidFill>
             <a:schemeClr val="tx1"/>
           </a:solidFill>
@@ -3582,16 +3592,16 @@
           <a:cs typeface="+mn-cs"/>
         </a:defRPr>
       </a:lvl4pPr>
-      <a:lvl5pPr marL="1496347" indent="-166261" algn="l" defTabSz="665043" rtl="0" eaLnBrk="1" latinLnBrk="0" hangingPunct="1">
+      <a:lvl5pPr marL="1536466" indent="-170718" algn="l" defTabSz="682874" rtl="0" eaLnBrk="1" latinLnBrk="0" hangingPunct="1">
         <a:lnSpc>
           <a:spcPct val="90000"/>
         </a:lnSpc>
         <a:spcBef>
-          <a:spcPts val="364"/>
+          <a:spcPts val="373"/>
         </a:spcBef>
         <a:buFont typeface="Arial" panose="020B0604020202020204" pitchFamily="34" charset="0"/>
         <a:buChar char="•"/>
-        <a:defRPr sz="1309" kern="1200">
+        <a:defRPr sz="1344" kern="1200">
           <a:solidFill>
             <a:schemeClr val="tx1"/>
           </a:solidFill>
@@ -3600,16 +3610,16 @@
           <a:cs typeface="+mn-cs"/>
         </a:defRPr>
       </a:lvl5pPr>
-      <a:lvl6pPr marL="1828869" indent="-166261" algn="l" defTabSz="665043" rtl="0" eaLnBrk="1" latinLnBrk="0" hangingPunct="1">
+      <a:lvl6pPr marL="1877903" indent="-170718" algn="l" defTabSz="682874" rtl="0" eaLnBrk="1" latinLnBrk="0" hangingPunct="1">
         <a:lnSpc>
           <a:spcPct val="90000"/>
         </a:lnSpc>
         <a:spcBef>
-          <a:spcPts val="364"/>
+          <a:spcPts val="373"/>
         </a:spcBef>
         <a:buFont typeface="Arial" panose="020B0604020202020204" pitchFamily="34" charset="0"/>
         <a:buChar char="•"/>
-        <a:defRPr sz="1309" kern="1200">
+        <a:defRPr sz="1344" kern="1200">
           <a:solidFill>
             <a:schemeClr val="tx1"/>
           </a:solidFill>
@@ -3618,16 +3628,16 @@
           <a:cs typeface="+mn-cs"/>
         </a:defRPr>
       </a:lvl6pPr>
-      <a:lvl7pPr marL="2161390" indent="-166261" algn="l" defTabSz="665043" rtl="0" eaLnBrk="1" latinLnBrk="0" hangingPunct="1">
+      <a:lvl7pPr marL="2219340" indent="-170718" algn="l" defTabSz="682874" rtl="0" eaLnBrk="1" latinLnBrk="0" hangingPunct="1">
         <a:lnSpc>
           <a:spcPct val="90000"/>
         </a:lnSpc>
         <a:spcBef>
-          <a:spcPts val="364"/>
+          <a:spcPts val="373"/>
         </a:spcBef>
         <a:buFont typeface="Arial" panose="020B0604020202020204" pitchFamily="34" charset="0"/>
         <a:buChar char="•"/>
-        <a:defRPr sz="1309" kern="1200">
+        <a:defRPr sz="1344" kern="1200">
           <a:solidFill>
             <a:schemeClr val="tx1"/>
           </a:solidFill>
@@ -3636,16 +3646,16 @@
           <a:cs typeface="+mn-cs"/>
         </a:defRPr>
       </a:lvl7pPr>
-      <a:lvl8pPr marL="2493912" indent="-166261" algn="l" defTabSz="665043" rtl="0" eaLnBrk="1" latinLnBrk="0" hangingPunct="1">
+      <a:lvl8pPr marL="2560777" indent="-170718" algn="l" defTabSz="682874" rtl="0" eaLnBrk="1" latinLnBrk="0" hangingPunct="1">
         <a:lnSpc>
           <a:spcPct val="90000"/>
         </a:lnSpc>
         <a:spcBef>
-          <a:spcPts val="364"/>
+          <a:spcPts val="373"/>
         </a:spcBef>
         <a:buFont typeface="Arial" panose="020B0604020202020204" pitchFamily="34" charset="0"/>
         <a:buChar char="•"/>
-        <a:defRPr sz="1309" kern="1200">
+        <a:defRPr sz="1344" kern="1200">
           <a:solidFill>
             <a:schemeClr val="tx1"/>
           </a:solidFill>
@@ -3654,16 +3664,16 @@
           <a:cs typeface="+mn-cs"/>
         </a:defRPr>
       </a:lvl8pPr>
-      <a:lvl9pPr marL="2826433" indent="-166261" algn="l" defTabSz="665043" rtl="0" eaLnBrk="1" latinLnBrk="0" hangingPunct="1">
+      <a:lvl9pPr marL="2902214" indent="-170718" algn="l" defTabSz="682874" rtl="0" eaLnBrk="1" latinLnBrk="0" hangingPunct="1">
         <a:lnSpc>
           <a:spcPct val="90000"/>
         </a:lnSpc>
         <a:spcBef>
-          <a:spcPts val="364"/>
+          <a:spcPts val="373"/>
         </a:spcBef>
         <a:buFont typeface="Arial" panose="020B0604020202020204" pitchFamily="34" charset="0"/>
         <a:buChar char="•"/>
-        <a:defRPr sz="1309" kern="1200">
+        <a:defRPr sz="1344" kern="1200">
           <a:solidFill>
             <a:schemeClr val="tx1"/>
           </a:solidFill>
@@ -3677,8 +3687,8 @@
       <a:defPPr>
         <a:defRPr lang="en-US"/>
       </a:defPPr>
-      <a:lvl1pPr marL="0" algn="l" defTabSz="665043" rtl="0" eaLnBrk="1" latinLnBrk="0" hangingPunct="1">
-        <a:defRPr sz="1309" kern="1200">
+      <a:lvl1pPr marL="0" algn="l" defTabSz="682874" rtl="0" eaLnBrk="1" latinLnBrk="0" hangingPunct="1">
+        <a:defRPr sz="1344" kern="1200">
           <a:solidFill>
             <a:schemeClr val="tx1"/>
           </a:solidFill>
@@ -3687,8 +3697,8 @@
           <a:cs typeface="+mn-cs"/>
         </a:defRPr>
       </a:lvl1pPr>
-      <a:lvl2pPr marL="332522" algn="l" defTabSz="665043" rtl="0" eaLnBrk="1" latinLnBrk="0" hangingPunct="1">
-        <a:defRPr sz="1309" kern="1200">
+      <a:lvl2pPr marL="341437" algn="l" defTabSz="682874" rtl="0" eaLnBrk="1" latinLnBrk="0" hangingPunct="1">
+        <a:defRPr sz="1344" kern="1200">
           <a:solidFill>
             <a:schemeClr val="tx1"/>
           </a:solidFill>
@@ -3697,8 +3707,8 @@
           <a:cs typeface="+mn-cs"/>
         </a:defRPr>
       </a:lvl2pPr>
-      <a:lvl3pPr marL="665043" algn="l" defTabSz="665043" rtl="0" eaLnBrk="1" latinLnBrk="0" hangingPunct="1">
-        <a:defRPr sz="1309" kern="1200">
+      <a:lvl3pPr marL="682874" algn="l" defTabSz="682874" rtl="0" eaLnBrk="1" latinLnBrk="0" hangingPunct="1">
+        <a:defRPr sz="1344" kern="1200">
           <a:solidFill>
             <a:schemeClr val="tx1"/>
           </a:solidFill>
@@ -3707,8 +3717,8 @@
           <a:cs typeface="+mn-cs"/>
         </a:defRPr>
       </a:lvl3pPr>
-      <a:lvl4pPr marL="997565" algn="l" defTabSz="665043" rtl="0" eaLnBrk="1" latinLnBrk="0" hangingPunct="1">
-        <a:defRPr sz="1309" kern="1200">
+      <a:lvl4pPr marL="1024311" algn="l" defTabSz="682874" rtl="0" eaLnBrk="1" latinLnBrk="0" hangingPunct="1">
+        <a:defRPr sz="1344" kern="1200">
           <a:solidFill>
             <a:schemeClr val="tx1"/>
           </a:solidFill>
@@ -3717,8 +3727,8 @@
           <a:cs typeface="+mn-cs"/>
         </a:defRPr>
       </a:lvl4pPr>
-      <a:lvl5pPr marL="1330086" algn="l" defTabSz="665043" rtl="0" eaLnBrk="1" latinLnBrk="0" hangingPunct="1">
-        <a:defRPr sz="1309" kern="1200">
+      <a:lvl5pPr marL="1365748" algn="l" defTabSz="682874" rtl="0" eaLnBrk="1" latinLnBrk="0" hangingPunct="1">
+        <a:defRPr sz="1344" kern="1200">
           <a:solidFill>
             <a:schemeClr val="tx1"/>
           </a:solidFill>
@@ -3727,8 +3737,8 @@
           <a:cs typeface="+mn-cs"/>
         </a:defRPr>
       </a:lvl5pPr>
-      <a:lvl6pPr marL="1662608" algn="l" defTabSz="665043" rtl="0" eaLnBrk="1" latinLnBrk="0" hangingPunct="1">
-        <a:defRPr sz="1309" kern="1200">
+      <a:lvl6pPr marL="1707185" algn="l" defTabSz="682874" rtl="0" eaLnBrk="1" latinLnBrk="0" hangingPunct="1">
+        <a:defRPr sz="1344" kern="1200">
           <a:solidFill>
             <a:schemeClr val="tx1"/>
           </a:solidFill>
@@ -3737,8 +3747,8 @@
           <a:cs typeface="+mn-cs"/>
         </a:defRPr>
       </a:lvl6pPr>
-      <a:lvl7pPr marL="1995129" algn="l" defTabSz="665043" rtl="0" eaLnBrk="1" latinLnBrk="0" hangingPunct="1">
-        <a:defRPr sz="1309" kern="1200">
+      <a:lvl7pPr marL="2048622" algn="l" defTabSz="682874" rtl="0" eaLnBrk="1" latinLnBrk="0" hangingPunct="1">
+        <a:defRPr sz="1344" kern="1200">
           <a:solidFill>
             <a:schemeClr val="tx1"/>
           </a:solidFill>
@@ -3747,8 +3757,8 @@
           <a:cs typeface="+mn-cs"/>
         </a:defRPr>
       </a:lvl7pPr>
-      <a:lvl8pPr marL="2327651" algn="l" defTabSz="665043" rtl="0" eaLnBrk="1" latinLnBrk="0" hangingPunct="1">
-        <a:defRPr sz="1309" kern="1200">
+      <a:lvl8pPr marL="2390059" algn="l" defTabSz="682874" rtl="0" eaLnBrk="1" latinLnBrk="0" hangingPunct="1">
+        <a:defRPr sz="1344" kern="1200">
           <a:solidFill>
             <a:schemeClr val="tx1"/>
           </a:solidFill>
@@ -3757,8 +3767,8 @@
           <a:cs typeface="+mn-cs"/>
         </a:defRPr>
       </a:lvl8pPr>
-      <a:lvl9pPr marL="2660172" algn="l" defTabSz="665043" rtl="0" eaLnBrk="1" latinLnBrk="0" hangingPunct="1">
-        <a:defRPr sz="1309" kern="1200">
+      <a:lvl9pPr marL="2731496" algn="l" defTabSz="682874" rtl="0" eaLnBrk="1" latinLnBrk="0" hangingPunct="1">
+        <a:defRPr sz="1344" kern="1200">
           <a:solidFill>
             <a:schemeClr val="tx1"/>
           </a:solidFill>
@@ -3797,7 +3807,7 @@
         </p:nvSpPr>
         <p:spPr bwMode="auto">
           <a:xfrm>
-            <a:off x="3896810" y="3267570"/>
+            <a:off x="3896811" y="1126995"/>
             <a:ext cx="3718231" cy="3175745"/>
           </a:xfrm>
           <a:prstGeom prst="roundRect">
@@ -3952,7 +3962,7 @@
         </p:nvSpPr>
         <p:spPr bwMode="auto">
           <a:xfrm>
-            <a:off x="9514303" y="3267570"/>
+            <a:off x="9514303" y="1126995"/>
             <a:ext cx="2256164" cy="3175745"/>
           </a:xfrm>
           <a:prstGeom prst="roundRect">
@@ -4124,7 +4134,7 @@
         </p:nvSpPr>
         <p:spPr bwMode="auto">
           <a:xfrm>
-            <a:off x="9615482" y="5227314"/>
+            <a:off x="9615483" y="3086738"/>
             <a:ext cx="1037771" cy="1099636"/>
           </a:xfrm>
           <a:prstGeom prst="roundRect">
@@ -4287,7 +4297,7 @@
         </p:nvSpPr>
         <p:spPr bwMode="auto">
           <a:xfrm>
-            <a:off x="181048" y="4981817"/>
+            <a:off x="181048" y="2841242"/>
             <a:ext cx="1937670" cy="815259"/>
           </a:xfrm>
           <a:prstGeom prst="roundRect">
@@ -4421,7 +4431,7 @@
             <a:pPr algn="ctr" fontAlgn="ctr">
               <a:defRPr/>
             </a:pPr>
-            <a:endParaRPr lang="en-US" altLang="ja-JP" sz="1455" b="1" kern="0" dirty="0" smtClean="0">
+            <a:endParaRPr lang="en-US" altLang="ja-JP" sz="1455" b="1" kern="0" dirty="0">
               <a:solidFill>
                 <a:srgbClr val="000000"/>
               </a:solidFill>
@@ -4434,7 +4444,7 @@
               <a:defRPr/>
             </a:pPr>
             <a:r>
-              <a:rPr lang="en-US" altLang="ja-JP" sz="1455" b="1" kern="0" dirty="0" smtClean="0">
+              <a:rPr lang="en-US" altLang="ja-JP" sz="1455" b="1" kern="0" dirty="0">
                 <a:solidFill>
                   <a:srgbClr val="000000"/>
                 </a:solidFill>
@@ -4479,7 +4489,7 @@
         </p:nvSpPr>
         <p:spPr bwMode="auto">
           <a:xfrm>
-            <a:off x="10750334" y="5227314"/>
+            <a:off x="10750334" y="3086738"/>
             <a:ext cx="915394" cy="1099636"/>
           </a:xfrm>
           <a:prstGeom prst="roundRect">
@@ -4630,7 +4640,7 @@
         </p:nvSpPr>
         <p:spPr>
           <a:xfrm>
-            <a:off x="10867090" y="5606035"/>
+            <a:off x="10867091" y="3465460"/>
             <a:ext cx="680727" cy="628433"/>
           </a:xfrm>
           <a:prstGeom prst="rect">
@@ -4794,7 +4804,7 @@
         </p:nvSpPr>
         <p:spPr bwMode="auto">
           <a:xfrm>
-            <a:off x="9615481" y="3930327"/>
+            <a:off x="9615482" y="1789752"/>
             <a:ext cx="2050247" cy="1203697"/>
           </a:xfrm>
           <a:prstGeom prst="roundRect">
@@ -4943,7 +4953,7 @@
         </p:nvCxnSpPr>
         <p:spPr>
           <a:xfrm>
-            <a:off x="1413383" y="5775729"/>
+            <a:off x="1413383" y="3635154"/>
             <a:ext cx="1569558" cy="541277"/>
           </a:xfrm>
           <a:prstGeom prst="bentConnector3">
@@ -4970,7 +4980,7 @@
         </p:nvCxnSpPr>
         <p:spPr>
           <a:xfrm rot="10800000">
-            <a:off x="1290030" y="5744163"/>
+            <a:off x="1290031" y="3603588"/>
             <a:ext cx="1596489" cy="809103"/>
           </a:xfrm>
           <a:prstGeom prst="bentConnector2">
@@ -4995,7 +5005,7 @@
         </p:nvSpPr>
         <p:spPr>
           <a:xfrm>
-            <a:off x="1448308" y="6001816"/>
+            <a:off x="1448308" y="3861240"/>
             <a:ext cx="1386020" cy="293798"/>
           </a:xfrm>
           <a:prstGeom prst="rect">
@@ -5033,7 +5043,7 @@
         </p:nvSpPr>
         <p:spPr>
           <a:xfrm>
-            <a:off x="1417722" y="6553266"/>
+            <a:off x="1417723" y="4412690"/>
             <a:ext cx="1447191" cy="293798"/>
           </a:xfrm>
           <a:prstGeom prst="rect">
@@ -5053,15 +5063,7 @@
                   <a:prstClr val="black"/>
                 </a:solidFill>
               </a:rPr>
-              <a:t>2</a:t>
-            </a:r>
-            <a:r>
-              <a:rPr lang="en-GB" sz="1309" dirty="0">
-                <a:solidFill>
-                  <a:prstClr val="black"/>
-                </a:solidFill>
-              </a:rPr>
-              <a:t>. Action response</a:t>
+              <a:t>2. Action response</a:t>
             </a:r>
             <a:endParaRPr lang="fi-FI" sz="1309" dirty="0">
               <a:solidFill>
@@ -5079,7 +5081,7 @@
         </p:nvSpPr>
         <p:spPr bwMode="auto">
           <a:xfrm>
-            <a:off x="4001549" y="3646135"/>
+            <a:off x="4001550" y="1505559"/>
             <a:ext cx="3508753" cy="826036"/>
           </a:xfrm>
           <a:prstGeom prst="roundRect">
@@ -5225,7 +5227,7 @@
         </p:nvSpPr>
         <p:spPr bwMode="auto">
           <a:xfrm>
-            <a:off x="4001548" y="5225911"/>
+            <a:off x="4001548" y="3085335"/>
             <a:ext cx="1701818" cy="1099636"/>
           </a:xfrm>
           <a:prstGeom prst="roundRect">
@@ -5387,7 +5389,7 @@
         </p:blipFill>
         <p:spPr>
           <a:xfrm>
-            <a:off x="6736240" y="3026712"/>
+            <a:off x="6736241" y="886136"/>
             <a:ext cx="1392035" cy="556814"/>
           </a:xfrm>
           <a:prstGeom prst="rect">
@@ -5403,7 +5405,7 @@
         </p:nvSpPr>
         <p:spPr bwMode="auto">
           <a:xfrm>
-            <a:off x="4001548" y="4347508"/>
+            <a:off x="4001548" y="2206933"/>
             <a:ext cx="3508752" cy="785113"/>
           </a:xfrm>
           <a:prstGeom prst="roundRect">
@@ -5549,7 +5551,7 @@
         </p:nvSpPr>
         <p:spPr bwMode="auto">
           <a:xfrm>
-            <a:off x="4001548" y="4634011"/>
+            <a:off x="4001548" y="2493435"/>
             <a:ext cx="3508752" cy="498610"/>
           </a:xfrm>
           <a:prstGeom prst="roundRect">
@@ -5697,7 +5699,7 @@
         </p:nvSpPr>
         <p:spPr bwMode="auto">
           <a:xfrm>
-            <a:off x="4001549" y="4209218"/>
+            <a:off x="4001550" y="2068643"/>
             <a:ext cx="3508753" cy="418909"/>
           </a:xfrm>
           <a:prstGeom prst="roundRect">
@@ -5846,7 +5848,7 @@
         </p:nvCxnSpPr>
         <p:spPr>
           <a:xfrm rot="16200000" flipV="1">
-            <a:off x="7656461" y="3715606"/>
+            <a:off x="7656461" y="1575030"/>
             <a:ext cx="686318" cy="1283780"/>
           </a:xfrm>
           <a:prstGeom prst="bentConnector2">
@@ -5871,7 +5873,7 @@
         </p:nvCxnSpPr>
         <p:spPr>
           <a:xfrm rot="16200000" flipV="1">
-            <a:off x="7658328" y="3721495"/>
+            <a:off x="7658328" y="1580919"/>
             <a:ext cx="686318" cy="1283780"/>
           </a:xfrm>
           <a:prstGeom prst="bentConnector2">
@@ -5896,7 +5898,7 @@
         </p:nvGrpSpPr>
         <p:grpSpPr>
           <a:xfrm>
-            <a:off x="7900744" y="4700654"/>
+            <a:off x="7900744" y="2560078"/>
             <a:ext cx="1498866" cy="602182"/>
             <a:chOff x="2670082" y="4186219"/>
             <a:chExt cx="2060941" cy="828000"/>
@@ -6637,7 +6639,7 @@
         </p:nvSpPr>
         <p:spPr>
           <a:xfrm rot="5400000">
-            <a:off x="9279335" y="4762370"/>
+            <a:off x="9279335" y="2621795"/>
             <a:ext cx="319732" cy="377429"/>
           </a:xfrm>
           <a:prstGeom prst="downArrow">
@@ -6773,7 +6775,7 @@
         </p:nvSpPr>
         <p:spPr bwMode="auto">
           <a:xfrm>
-            <a:off x="5779087" y="5227981"/>
+            <a:off x="5779087" y="3087405"/>
             <a:ext cx="1701818" cy="1099636"/>
           </a:xfrm>
           <a:prstGeom prst="roundRect">
@@ -6924,7 +6926,7 @@
         </p:nvCxnSpPr>
         <p:spPr>
           <a:xfrm flipV="1">
-            <a:off x="7480905" y="5777132"/>
+            <a:off x="7480905" y="3636556"/>
             <a:ext cx="2134576" cy="666"/>
           </a:xfrm>
           <a:prstGeom prst="bentConnector3">
@@ -6951,7 +6953,7 @@
         </p:nvCxnSpPr>
         <p:spPr>
           <a:xfrm rot="10800000" flipV="1">
-            <a:off x="7450825" y="6142381"/>
+            <a:off x="7450826" y="4001806"/>
             <a:ext cx="2130411" cy="1"/>
           </a:xfrm>
           <a:prstGeom prst="bentConnector3">
@@ -6978,7 +6980,7 @@
         </p:nvSpPr>
         <p:spPr>
           <a:xfrm>
-            <a:off x="7941465" y="5809588"/>
+            <a:off x="7941465" y="3669012"/>
             <a:ext cx="1386020" cy="293798"/>
           </a:xfrm>
           <a:prstGeom prst="rect">
@@ -7016,7 +7018,7 @@
         </p:nvSpPr>
         <p:spPr>
           <a:xfrm>
-            <a:off x="7880143" y="6191245"/>
+            <a:off x="7880144" y="4050669"/>
             <a:ext cx="1447191" cy="293798"/>
           </a:xfrm>
           <a:prstGeom prst="rect">
@@ -7036,15 +7038,7 @@
                   <a:prstClr val="black"/>
                 </a:solidFill>
               </a:rPr>
-              <a:t>2</a:t>
-            </a:r>
-            <a:r>
-              <a:rPr lang="en-GB" sz="1309" dirty="0">
-                <a:solidFill>
-                  <a:prstClr val="black"/>
-                </a:solidFill>
-              </a:rPr>
-              <a:t>. Action response</a:t>
+              <a:t>2. Action response</a:t>
             </a:r>
             <a:endParaRPr lang="fi-FI" sz="1309" dirty="0">
               <a:solidFill>
@@ -7062,7 +7056,7 @@
         </p:nvGrpSpPr>
         <p:grpSpPr>
           <a:xfrm>
-            <a:off x="104481" y="2448952"/>
+            <a:off x="104482" y="308376"/>
             <a:ext cx="2190547" cy="1106684"/>
             <a:chOff x="683568" y="79792"/>
             <a:chExt cx="2491222" cy="1700168"/>
@@ -7475,7 +7469,7 @@
         </p:nvSpPr>
         <p:spPr>
           <a:xfrm>
-            <a:off x="271040" y="3070596"/>
+            <a:off x="271041" y="930021"/>
             <a:ext cx="1749287" cy="516835"/>
           </a:xfrm>
           <a:prstGeom prst="rect">
@@ -7526,7 +7520,7 @@
         </p:nvCxnSpPr>
         <p:spPr>
           <a:xfrm rot="10800000">
-            <a:off x="2020327" y="3329015"/>
+            <a:off x="2020327" y="1188440"/>
             <a:ext cx="1519020" cy="6411"/>
           </a:xfrm>
           <a:prstGeom prst="bentConnector3">
@@ -7556,7 +7550,7 @@
         </p:nvCxnSpPr>
         <p:spPr>
           <a:xfrm rot="16200000" flipH="1">
-            <a:off x="450590" y="4282524"/>
+            <a:off x="450590" y="2141949"/>
             <a:ext cx="1394386" cy="4199"/>
           </a:xfrm>
           <a:prstGeom prst="bentConnector3">
@@ -7584,7 +7578,7 @@
         </p:nvSpPr>
         <p:spPr>
           <a:xfrm>
-            <a:off x="3746090" y="2585884"/>
+            <a:off x="3746090" y="445308"/>
             <a:ext cx="8210704" cy="4159046"/>
           </a:xfrm>
           <a:prstGeom prst="rect">
@@ -7631,7 +7625,7 @@
         </p:nvSpPr>
         <p:spPr>
           <a:xfrm>
-            <a:off x="10293896" y="2708878"/>
+            <a:off x="10293896" y="568302"/>
             <a:ext cx="1498680" cy="369332"/>
           </a:xfrm>
           <a:prstGeom prst="rect">
@@ -7646,7 +7640,7 @@
           <a:lstStyle/>
           <a:p>
             <a:r>
-              <a:rPr lang="en-GB" dirty="0" smtClean="0">
+              <a:rPr lang="en-GB" dirty="0">
                 <a:solidFill>
                   <a:schemeClr val="accent5"/>
                 </a:solidFill>
@@ -7669,7 +7663,7 @@
         </p:nvGrpSpPr>
         <p:grpSpPr>
           <a:xfrm>
-            <a:off x="520591" y="3943191"/>
+            <a:off x="520592" y="1802615"/>
             <a:ext cx="1302309" cy="596604"/>
             <a:chOff x="2670082" y="4186219"/>
             <a:chExt cx="2060941" cy="828000"/>
@@ -8410,7 +8404,7 @@
         </p:nvSpPr>
         <p:spPr bwMode="auto">
           <a:xfrm rot="16200000">
-            <a:off x="1320508" y="4275502"/>
+            <a:off x="1320508" y="2134927"/>
             <a:ext cx="4136830" cy="757591"/>
           </a:xfrm>
           <a:prstGeom prst="roundRect">
@@ -8544,7 +8538,7 @@
             <a:pPr algn="ctr" fontAlgn="ctr">
               <a:defRPr/>
             </a:pPr>
-            <a:endParaRPr lang="en-US" altLang="ja-JP" sz="1455" b="1" kern="0" dirty="0" smtClean="0">
+            <a:endParaRPr lang="en-US" altLang="ja-JP" sz="1455" b="1" kern="0" dirty="0">
               <a:solidFill>
                 <a:srgbClr val="000000"/>
               </a:solidFill>
@@ -8557,7 +8551,7 @@
               <a:defRPr/>
             </a:pPr>
             <a:r>
-              <a:rPr lang="en-US" altLang="ja-JP" sz="1455" b="1" kern="0" dirty="0" smtClean="0">
+              <a:rPr lang="en-US" altLang="ja-JP" sz="1455" b="1" kern="0" dirty="0">
                 <a:solidFill>
                   <a:srgbClr val="000000"/>
                 </a:solidFill>
@@ -8584,7 +8578,7 @@
         </p:nvGrpSpPr>
         <p:grpSpPr>
           <a:xfrm>
-            <a:off x="2521846" y="2981248"/>
+            <a:off x="2521847" y="840672"/>
             <a:ext cx="1302309" cy="596604"/>
             <a:chOff x="2670082" y="4186219"/>
             <a:chExt cx="2060941" cy="828000"/>
@@ -9325,7 +9319,7 @@
         </p:nvSpPr>
         <p:spPr>
           <a:xfrm rot="5400000">
-            <a:off x="3807140" y="3056769"/>
+            <a:off x="3807140" y="916194"/>
             <a:ext cx="319732" cy="377429"/>
           </a:xfrm>
           <a:prstGeom prst="downArrow">

</xml_diff>

<commit_message>
various fixes: hyperrefs, urls, figures, space, etc.
</commit_message>
<xml_diff>
--- a/figures/wot-scenario-source.pptx
+++ b/figures/wot-scenario-source.pptx
@@ -2,7 +2,7 @@
 <file path=ppt/presentation.xml><?xml version="1.0" encoding="utf-8"?>
 <p:presentation xmlns:a="http://schemas.openxmlformats.org/drawingml/2006/main" xmlns:r="http://schemas.openxmlformats.org/officeDocument/2006/relationships" xmlns:p="http://schemas.openxmlformats.org/presentationml/2006/main" saveSubsetFonts="1">
   <p:sldMasterIdLst>
-    <p:sldMasterId id="2147483672" r:id="rId1"/>
+    <p:sldMasterId id="2147483708" r:id="rId1"/>
   </p:sldMasterIdLst>
   <p:notesMasterIdLst>
     <p:notesMasterId r:id="rId3"/>
@@ -10,7 +10,7 @@
   <p:sldIdLst>
     <p:sldId id="257" r:id="rId2"/>
   </p:sldIdLst>
-  <p:sldSz cx="12192000" cy="5121275"/>
+  <p:sldSz cx="12192000" cy="4479925"/>
   <p:notesSz cx="6858000" cy="9144000"/>
   <p:defaultTextStyle>
     <a:defPPr>
@@ -197,7 +197,7 @@
           <a:p>
             <a:fld id="{00E39959-6D4B-4E43-81FD-DD6A70473C6C}" type="datetimeFigureOut">
               <a:rPr lang="fi-FI" smtClean="0"/>
-              <a:t>4.12.2017</a:t>
+              <a:t>5.12.2017</a:t>
             </a:fld>
             <a:endParaRPr lang="fi-FI"/>
           </a:p>
@@ -215,8 +215,8 @@
         </p:nvSpPr>
         <p:spPr>
           <a:xfrm>
-            <a:off x="-242888" y="1143000"/>
-            <a:ext cx="7343776" cy="3086100"/>
+            <a:off x="-769938" y="1143000"/>
+            <a:ext cx="8397876" cy="3086100"/>
           </a:xfrm>
           <a:prstGeom prst="rect">
             <a:avLst/>
@@ -494,8 +494,8 @@
         </p:nvSpPr>
         <p:spPr>
           <a:xfrm>
-            <a:off x="-242888" y="1143000"/>
-            <a:ext cx="7343776" cy="3086100"/>
+            <a:off x="-769938" y="1143000"/>
+            <a:ext cx="8397876" cy="3086100"/>
           </a:xfrm>
         </p:spPr>
       </p:sp>
@@ -583,15 +583,15 @@
         </p:nvSpPr>
         <p:spPr>
           <a:xfrm>
-            <a:off x="1524000" y="838135"/>
-            <a:ext cx="9144000" cy="1782962"/>
+            <a:off x="1524000" y="733173"/>
+            <a:ext cx="9144000" cy="1559678"/>
           </a:xfrm>
         </p:spPr>
         <p:txBody>
           <a:bodyPr anchor="b"/>
           <a:lstStyle>
             <a:lvl1pPr algn="ctr">
-              <a:defRPr sz="4481"/>
+              <a:defRPr sz="3919"/>
             </a:lvl1pPr>
           </a:lstStyle>
           <a:p>
@@ -615,8 +615,8 @@
         </p:nvSpPr>
         <p:spPr>
           <a:xfrm>
-            <a:off x="1524000" y="2689855"/>
-            <a:ext cx="9144000" cy="1236456"/>
+            <a:off x="1524000" y="2352998"/>
+            <a:ext cx="9144000" cy="1081611"/>
           </a:xfrm>
         </p:spPr>
         <p:txBody>
@@ -624,39 +624,39 @@
           <a:lstStyle>
             <a:lvl1pPr marL="0" indent="0" algn="ctr">
               <a:buNone/>
-              <a:defRPr sz="1792"/>
+              <a:defRPr sz="1568"/>
             </a:lvl1pPr>
-            <a:lvl2pPr marL="341437" indent="0" algn="ctr">
+            <a:lvl2pPr marL="298643" indent="0" algn="ctr">
               <a:buNone/>
-              <a:defRPr sz="1494"/>
+              <a:defRPr sz="1306"/>
             </a:lvl2pPr>
-            <a:lvl3pPr marL="682874" indent="0" algn="ctr">
+            <a:lvl3pPr marL="597286" indent="0" algn="ctr">
               <a:buNone/>
-              <a:defRPr sz="1344"/>
+              <a:defRPr sz="1176"/>
             </a:lvl3pPr>
-            <a:lvl4pPr marL="1024311" indent="0" algn="ctr">
+            <a:lvl4pPr marL="895929" indent="0" algn="ctr">
               <a:buNone/>
-              <a:defRPr sz="1195"/>
+              <a:defRPr sz="1045"/>
             </a:lvl4pPr>
-            <a:lvl5pPr marL="1365748" indent="0" algn="ctr">
+            <a:lvl5pPr marL="1194572" indent="0" algn="ctr">
               <a:buNone/>
-              <a:defRPr sz="1195"/>
+              <a:defRPr sz="1045"/>
             </a:lvl5pPr>
-            <a:lvl6pPr marL="1707185" indent="0" algn="ctr">
+            <a:lvl6pPr marL="1493215" indent="0" algn="ctr">
               <a:buNone/>
-              <a:defRPr sz="1195"/>
+              <a:defRPr sz="1045"/>
             </a:lvl6pPr>
-            <a:lvl7pPr marL="2048622" indent="0" algn="ctr">
+            <a:lvl7pPr marL="1791858" indent="0" algn="ctr">
               <a:buNone/>
-              <a:defRPr sz="1195"/>
+              <a:defRPr sz="1045"/>
             </a:lvl7pPr>
-            <a:lvl8pPr marL="2390059" indent="0" algn="ctr">
+            <a:lvl8pPr marL="2090501" indent="0" algn="ctr">
               <a:buNone/>
-              <a:defRPr sz="1195"/>
+              <a:defRPr sz="1045"/>
             </a:lvl8pPr>
-            <a:lvl9pPr marL="2731496" indent="0" algn="ctr">
+            <a:lvl9pPr marL="2389144" indent="0" algn="ctr">
               <a:buNone/>
-              <a:defRPr sz="1195"/>
+              <a:defRPr sz="1045"/>
             </a:lvl9pPr>
           </a:lstStyle>
           <a:p>
@@ -692,7 +692,7 @@
                 </a:solidFill>
               </a:rPr>
               <a:pPr/>
-              <a:t>4.12.2017</a:t>
+              <a:t>5.12.2017</a:t>
             </a:fld>
             <a:endParaRPr lang="fi-FI">
               <a:solidFill>
@@ -768,7 +768,7 @@
     </p:spTree>
     <p:extLst>
       <p:ext uri="{BB962C8B-B14F-4D97-AF65-F5344CB8AC3E}">
-        <p14:creationId xmlns:p14="http://schemas.microsoft.com/office/powerpoint/2010/main" val="3861533655"/>
+        <p14:creationId xmlns:p14="http://schemas.microsoft.com/office/powerpoint/2010/main" val="2915504997"/>
       </p:ext>
     </p:extLst>
   </p:cSld>
@@ -894,7 +894,7 @@
                 </a:solidFill>
               </a:rPr>
               <a:pPr/>
-              <a:t>4.12.2017</a:t>
+              <a:t>5.12.2017</a:t>
             </a:fld>
             <a:endParaRPr lang="fi-FI">
               <a:solidFill>
@@ -970,7 +970,7 @@
     </p:spTree>
     <p:extLst>
       <p:ext uri="{BB962C8B-B14F-4D97-AF65-F5344CB8AC3E}">
-        <p14:creationId xmlns:p14="http://schemas.microsoft.com/office/powerpoint/2010/main" val="345776286"/>
+        <p14:creationId xmlns:p14="http://schemas.microsoft.com/office/powerpoint/2010/main" val="4153892732"/>
       </p:ext>
     </p:extLst>
   </p:cSld>
@@ -1009,8 +1009,8 @@
         </p:nvSpPr>
         <p:spPr>
           <a:xfrm>
-            <a:off x="8724900" y="272660"/>
-            <a:ext cx="2628900" cy="4340044"/>
+            <a:off x="8724900" y="238515"/>
+            <a:ext cx="2628900" cy="3796529"/>
           </a:xfrm>
         </p:spPr>
         <p:txBody>
@@ -1037,8 +1037,8 @@
         </p:nvSpPr>
         <p:spPr>
           <a:xfrm>
-            <a:off x="838200" y="272660"/>
-            <a:ext cx="7734300" cy="4340044"/>
+            <a:off x="838200" y="238515"/>
+            <a:ext cx="7734300" cy="3796529"/>
           </a:xfrm>
         </p:spPr>
         <p:txBody>
@@ -1106,7 +1106,7 @@
                 </a:solidFill>
               </a:rPr>
               <a:pPr/>
-              <a:t>4.12.2017</a:t>
+              <a:t>5.12.2017</a:t>
             </a:fld>
             <a:endParaRPr lang="fi-FI">
               <a:solidFill>
@@ -1182,7 +1182,7 @@
     </p:spTree>
     <p:extLst>
       <p:ext uri="{BB962C8B-B14F-4D97-AF65-F5344CB8AC3E}">
-        <p14:creationId xmlns:p14="http://schemas.microsoft.com/office/powerpoint/2010/main" val="1368055081"/>
+        <p14:creationId xmlns:p14="http://schemas.microsoft.com/office/powerpoint/2010/main" val="2732245129"/>
       </p:ext>
     </p:extLst>
   </p:cSld>
@@ -1308,7 +1308,7 @@
                 </a:solidFill>
               </a:rPr>
               <a:pPr/>
-              <a:t>4.12.2017</a:t>
+              <a:t>5.12.2017</a:t>
             </a:fld>
             <a:endParaRPr lang="fi-FI">
               <a:solidFill>
@@ -1384,7 +1384,7 @@
     </p:spTree>
     <p:extLst>
       <p:ext uri="{BB962C8B-B14F-4D97-AF65-F5344CB8AC3E}">
-        <p14:creationId xmlns:p14="http://schemas.microsoft.com/office/powerpoint/2010/main" val="2178288834"/>
+        <p14:creationId xmlns:p14="http://schemas.microsoft.com/office/powerpoint/2010/main" val="70148406"/>
       </p:ext>
     </p:extLst>
   </p:cSld>
@@ -1423,15 +1423,15 @@
         </p:nvSpPr>
         <p:spPr>
           <a:xfrm>
-            <a:off x="831850" y="1276763"/>
-            <a:ext cx="10515600" cy="2130308"/>
+            <a:off x="831850" y="1116871"/>
+            <a:ext cx="10515600" cy="1863524"/>
           </a:xfrm>
         </p:spPr>
         <p:txBody>
           <a:bodyPr anchor="b"/>
           <a:lstStyle>
             <a:lvl1pPr>
-              <a:defRPr sz="4481"/>
+              <a:defRPr sz="3919"/>
             </a:lvl1pPr>
           </a:lstStyle>
           <a:p>
@@ -1455,8 +1455,8 @@
         </p:nvSpPr>
         <p:spPr>
           <a:xfrm>
-            <a:off x="831850" y="3427224"/>
-            <a:ext cx="10515600" cy="1120279"/>
+            <a:off x="831850" y="2998025"/>
+            <a:ext cx="10515600" cy="979983"/>
           </a:xfrm>
         </p:spPr>
         <p:txBody>
@@ -1464,7 +1464,7 @@
           <a:lstStyle>
             <a:lvl1pPr marL="0" indent="0">
               <a:buNone/>
-              <a:defRPr sz="1792">
+              <a:defRPr sz="1568">
                 <a:solidFill>
                   <a:schemeClr val="tx1">
                     <a:tint val="75000"/>
@@ -1472,9 +1472,9 @@
                 </a:solidFill>
               </a:defRPr>
             </a:lvl1pPr>
-            <a:lvl2pPr marL="341437" indent="0">
+            <a:lvl2pPr marL="298643" indent="0">
               <a:buNone/>
-              <a:defRPr sz="1494">
+              <a:defRPr sz="1306">
                 <a:solidFill>
                   <a:schemeClr val="tx1">
                     <a:tint val="75000"/>
@@ -1482,9 +1482,9 @@
                 </a:solidFill>
               </a:defRPr>
             </a:lvl2pPr>
-            <a:lvl3pPr marL="682874" indent="0">
+            <a:lvl3pPr marL="597286" indent="0">
               <a:buNone/>
-              <a:defRPr sz="1344">
+              <a:defRPr sz="1176">
                 <a:solidFill>
                   <a:schemeClr val="tx1">
                     <a:tint val="75000"/>
@@ -1492,9 +1492,9 @@
                 </a:solidFill>
               </a:defRPr>
             </a:lvl3pPr>
-            <a:lvl4pPr marL="1024311" indent="0">
+            <a:lvl4pPr marL="895929" indent="0">
               <a:buNone/>
-              <a:defRPr sz="1195">
+              <a:defRPr sz="1045">
                 <a:solidFill>
                   <a:schemeClr val="tx1">
                     <a:tint val="75000"/>
@@ -1502,9 +1502,9 @@
                 </a:solidFill>
               </a:defRPr>
             </a:lvl4pPr>
-            <a:lvl5pPr marL="1365748" indent="0">
+            <a:lvl5pPr marL="1194572" indent="0">
               <a:buNone/>
-              <a:defRPr sz="1195">
+              <a:defRPr sz="1045">
                 <a:solidFill>
                   <a:schemeClr val="tx1">
                     <a:tint val="75000"/>
@@ -1512,9 +1512,9 @@
                 </a:solidFill>
               </a:defRPr>
             </a:lvl5pPr>
-            <a:lvl6pPr marL="1707185" indent="0">
+            <a:lvl6pPr marL="1493215" indent="0">
               <a:buNone/>
-              <a:defRPr sz="1195">
+              <a:defRPr sz="1045">
                 <a:solidFill>
                   <a:schemeClr val="tx1">
                     <a:tint val="75000"/>
@@ -1522,9 +1522,9 @@
                 </a:solidFill>
               </a:defRPr>
             </a:lvl6pPr>
-            <a:lvl7pPr marL="2048622" indent="0">
+            <a:lvl7pPr marL="1791858" indent="0">
               <a:buNone/>
-              <a:defRPr sz="1195">
+              <a:defRPr sz="1045">
                 <a:solidFill>
                   <a:schemeClr val="tx1">
                     <a:tint val="75000"/>
@@ -1532,9 +1532,9 @@
                 </a:solidFill>
               </a:defRPr>
             </a:lvl7pPr>
-            <a:lvl8pPr marL="2390059" indent="0">
+            <a:lvl8pPr marL="2090501" indent="0">
               <a:buNone/>
-              <a:defRPr sz="1195">
+              <a:defRPr sz="1045">
                 <a:solidFill>
                   <a:schemeClr val="tx1">
                     <a:tint val="75000"/>
@@ -1542,9 +1542,9 @@
                 </a:solidFill>
               </a:defRPr>
             </a:lvl8pPr>
-            <a:lvl9pPr marL="2731496" indent="0">
+            <a:lvl9pPr marL="2389144" indent="0">
               <a:buNone/>
-              <a:defRPr sz="1195">
+              <a:defRPr sz="1045">
                 <a:solidFill>
                   <a:schemeClr val="tx1">
                     <a:tint val="75000"/>
@@ -1586,7 +1586,7 @@
                 </a:solidFill>
               </a:rPr>
               <a:pPr/>
-              <a:t>4.12.2017</a:t>
+              <a:t>5.12.2017</a:t>
             </a:fld>
             <a:endParaRPr lang="fi-FI">
               <a:solidFill>
@@ -1662,7 +1662,7 @@
     </p:spTree>
     <p:extLst>
       <p:ext uri="{BB962C8B-B14F-4D97-AF65-F5344CB8AC3E}">
-        <p14:creationId xmlns:p14="http://schemas.microsoft.com/office/powerpoint/2010/main" val="2999673811"/>
+        <p14:creationId xmlns:p14="http://schemas.microsoft.com/office/powerpoint/2010/main" val="1728894092"/>
       </p:ext>
     </p:extLst>
   </p:cSld>
@@ -1724,8 +1724,8 @@
         </p:nvSpPr>
         <p:spPr>
           <a:xfrm>
-            <a:off x="838200" y="1363302"/>
-            <a:ext cx="5181600" cy="3249402"/>
+            <a:off x="838200" y="1192573"/>
+            <a:ext cx="5181600" cy="2842471"/>
           </a:xfrm>
         </p:spPr>
         <p:txBody>
@@ -1781,8 +1781,8 @@
         </p:nvSpPr>
         <p:spPr>
           <a:xfrm>
-            <a:off x="6172200" y="1363302"/>
-            <a:ext cx="5181600" cy="3249402"/>
+            <a:off x="6172200" y="1192573"/>
+            <a:ext cx="5181600" cy="2842471"/>
           </a:xfrm>
         </p:spPr>
         <p:txBody>
@@ -1850,7 +1850,7 @@
                 </a:solidFill>
               </a:rPr>
               <a:pPr/>
-              <a:t>4.12.2017</a:t>
+              <a:t>5.12.2017</a:t>
             </a:fld>
             <a:endParaRPr lang="fi-FI">
               <a:solidFill>
@@ -1926,7 +1926,7 @@
     </p:spTree>
     <p:extLst>
       <p:ext uri="{BB962C8B-B14F-4D97-AF65-F5344CB8AC3E}">
-        <p14:creationId xmlns:p14="http://schemas.microsoft.com/office/powerpoint/2010/main" val="2229342520"/>
+        <p14:creationId xmlns:p14="http://schemas.microsoft.com/office/powerpoint/2010/main" val="3307251099"/>
       </p:ext>
     </p:extLst>
   </p:cSld>
@@ -1965,8 +1965,8 @@
         </p:nvSpPr>
         <p:spPr>
           <a:xfrm>
-            <a:off x="839788" y="272661"/>
-            <a:ext cx="10515600" cy="989876"/>
+            <a:off x="839788" y="238515"/>
+            <a:ext cx="10515600" cy="865912"/>
           </a:xfrm>
         </p:spPr>
         <p:txBody>
@@ -1993,8 +1993,8 @@
         </p:nvSpPr>
         <p:spPr>
           <a:xfrm>
-            <a:off x="839789" y="1255424"/>
-            <a:ext cx="5157787" cy="615264"/>
+            <a:off x="839789" y="1098204"/>
+            <a:ext cx="5157787" cy="538213"/>
           </a:xfrm>
         </p:spPr>
         <p:txBody>
@@ -2002,39 +2002,39 @@
           <a:lstStyle>
             <a:lvl1pPr marL="0" indent="0">
               <a:buNone/>
-              <a:defRPr sz="1792" b="1"/>
+              <a:defRPr sz="1568" b="1"/>
             </a:lvl1pPr>
-            <a:lvl2pPr marL="341437" indent="0">
+            <a:lvl2pPr marL="298643" indent="0">
               <a:buNone/>
-              <a:defRPr sz="1494" b="1"/>
+              <a:defRPr sz="1306" b="1"/>
             </a:lvl2pPr>
-            <a:lvl3pPr marL="682874" indent="0">
+            <a:lvl3pPr marL="597286" indent="0">
               <a:buNone/>
-              <a:defRPr sz="1344" b="1"/>
+              <a:defRPr sz="1176" b="1"/>
             </a:lvl3pPr>
-            <a:lvl4pPr marL="1024311" indent="0">
+            <a:lvl4pPr marL="895929" indent="0">
               <a:buNone/>
-              <a:defRPr sz="1195" b="1"/>
+              <a:defRPr sz="1045" b="1"/>
             </a:lvl4pPr>
-            <a:lvl5pPr marL="1365748" indent="0">
+            <a:lvl5pPr marL="1194572" indent="0">
               <a:buNone/>
-              <a:defRPr sz="1195" b="1"/>
+              <a:defRPr sz="1045" b="1"/>
             </a:lvl5pPr>
-            <a:lvl6pPr marL="1707185" indent="0">
+            <a:lvl6pPr marL="1493215" indent="0">
               <a:buNone/>
-              <a:defRPr sz="1195" b="1"/>
+              <a:defRPr sz="1045" b="1"/>
             </a:lvl6pPr>
-            <a:lvl7pPr marL="2048622" indent="0">
+            <a:lvl7pPr marL="1791858" indent="0">
               <a:buNone/>
-              <a:defRPr sz="1195" b="1"/>
+              <a:defRPr sz="1045" b="1"/>
             </a:lvl7pPr>
-            <a:lvl8pPr marL="2390059" indent="0">
+            <a:lvl8pPr marL="2090501" indent="0">
               <a:buNone/>
-              <a:defRPr sz="1195" b="1"/>
+              <a:defRPr sz="1045" b="1"/>
             </a:lvl8pPr>
-            <a:lvl9pPr marL="2731496" indent="0">
+            <a:lvl9pPr marL="2389144" indent="0">
               <a:buNone/>
-              <a:defRPr sz="1195" b="1"/>
+              <a:defRPr sz="1045" b="1"/>
             </a:lvl9pPr>
           </a:lstStyle>
           <a:p>
@@ -2058,8 +2058,8 @@
         </p:nvSpPr>
         <p:spPr>
           <a:xfrm>
-            <a:off x="839789" y="1870688"/>
-            <a:ext cx="5157787" cy="2751500"/>
+            <a:off x="839789" y="1636417"/>
+            <a:ext cx="5157787" cy="2406923"/>
           </a:xfrm>
         </p:spPr>
         <p:txBody>
@@ -2115,8 +2115,8 @@
         </p:nvSpPr>
         <p:spPr>
           <a:xfrm>
-            <a:off x="6172200" y="1255424"/>
-            <a:ext cx="5183188" cy="615264"/>
+            <a:off x="6172200" y="1098204"/>
+            <a:ext cx="5183188" cy="538213"/>
           </a:xfrm>
         </p:spPr>
         <p:txBody>
@@ -2124,39 +2124,39 @@
           <a:lstStyle>
             <a:lvl1pPr marL="0" indent="0">
               <a:buNone/>
-              <a:defRPr sz="1792" b="1"/>
+              <a:defRPr sz="1568" b="1"/>
             </a:lvl1pPr>
-            <a:lvl2pPr marL="341437" indent="0">
+            <a:lvl2pPr marL="298643" indent="0">
               <a:buNone/>
-              <a:defRPr sz="1494" b="1"/>
+              <a:defRPr sz="1306" b="1"/>
             </a:lvl2pPr>
-            <a:lvl3pPr marL="682874" indent="0">
+            <a:lvl3pPr marL="597286" indent="0">
               <a:buNone/>
-              <a:defRPr sz="1344" b="1"/>
+              <a:defRPr sz="1176" b="1"/>
             </a:lvl3pPr>
-            <a:lvl4pPr marL="1024311" indent="0">
+            <a:lvl4pPr marL="895929" indent="0">
               <a:buNone/>
-              <a:defRPr sz="1195" b="1"/>
+              <a:defRPr sz="1045" b="1"/>
             </a:lvl4pPr>
-            <a:lvl5pPr marL="1365748" indent="0">
+            <a:lvl5pPr marL="1194572" indent="0">
               <a:buNone/>
-              <a:defRPr sz="1195" b="1"/>
+              <a:defRPr sz="1045" b="1"/>
             </a:lvl5pPr>
-            <a:lvl6pPr marL="1707185" indent="0">
+            <a:lvl6pPr marL="1493215" indent="0">
               <a:buNone/>
-              <a:defRPr sz="1195" b="1"/>
+              <a:defRPr sz="1045" b="1"/>
             </a:lvl6pPr>
-            <a:lvl7pPr marL="2048622" indent="0">
+            <a:lvl7pPr marL="1791858" indent="0">
               <a:buNone/>
-              <a:defRPr sz="1195" b="1"/>
+              <a:defRPr sz="1045" b="1"/>
             </a:lvl7pPr>
-            <a:lvl8pPr marL="2390059" indent="0">
+            <a:lvl8pPr marL="2090501" indent="0">
               <a:buNone/>
-              <a:defRPr sz="1195" b="1"/>
+              <a:defRPr sz="1045" b="1"/>
             </a:lvl8pPr>
-            <a:lvl9pPr marL="2731496" indent="0">
+            <a:lvl9pPr marL="2389144" indent="0">
               <a:buNone/>
-              <a:defRPr sz="1195" b="1"/>
+              <a:defRPr sz="1045" b="1"/>
             </a:lvl9pPr>
           </a:lstStyle>
           <a:p>
@@ -2180,8 +2180,8 @@
         </p:nvSpPr>
         <p:spPr>
           <a:xfrm>
-            <a:off x="6172200" y="1870688"/>
-            <a:ext cx="5183188" cy="2751500"/>
+            <a:off x="6172200" y="1636417"/>
+            <a:ext cx="5183188" cy="2406923"/>
           </a:xfrm>
         </p:spPr>
         <p:txBody>
@@ -2249,7 +2249,7 @@
                 </a:solidFill>
               </a:rPr>
               <a:pPr/>
-              <a:t>4.12.2017</a:t>
+              <a:t>5.12.2017</a:t>
             </a:fld>
             <a:endParaRPr lang="fi-FI">
               <a:solidFill>
@@ -2325,7 +2325,7 @@
     </p:spTree>
     <p:extLst>
       <p:ext uri="{BB962C8B-B14F-4D97-AF65-F5344CB8AC3E}">
-        <p14:creationId xmlns:p14="http://schemas.microsoft.com/office/powerpoint/2010/main" val="1479396753"/>
+        <p14:creationId xmlns:p14="http://schemas.microsoft.com/office/powerpoint/2010/main" val="2903028671"/>
       </p:ext>
     </p:extLst>
   </p:cSld>
@@ -2399,7 +2399,7 @@
                 </a:solidFill>
               </a:rPr>
               <a:pPr/>
-              <a:t>4.12.2017</a:t>
+              <a:t>5.12.2017</a:t>
             </a:fld>
             <a:endParaRPr lang="fi-FI">
               <a:solidFill>
@@ -2475,7 +2475,7 @@
     </p:spTree>
     <p:extLst>
       <p:ext uri="{BB962C8B-B14F-4D97-AF65-F5344CB8AC3E}">
-        <p14:creationId xmlns:p14="http://schemas.microsoft.com/office/powerpoint/2010/main" val="3955754289"/>
+        <p14:creationId xmlns:p14="http://schemas.microsoft.com/office/powerpoint/2010/main" val="1152368430"/>
       </p:ext>
     </p:extLst>
   </p:cSld>
@@ -2526,7 +2526,7 @@
                 </a:solidFill>
               </a:rPr>
               <a:pPr/>
-              <a:t>4.12.2017</a:t>
+              <a:t>5.12.2017</a:t>
             </a:fld>
             <a:endParaRPr lang="fi-FI">
               <a:solidFill>
@@ -2602,7 +2602,7 @@
     </p:spTree>
     <p:extLst>
       <p:ext uri="{BB962C8B-B14F-4D97-AF65-F5344CB8AC3E}">
-        <p14:creationId xmlns:p14="http://schemas.microsoft.com/office/powerpoint/2010/main" val="2009961711"/>
+        <p14:creationId xmlns:p14="http://schemas.microsoft.com/office/powerpoint/2010/main" val="1607181250"/>
       </p:ext>
     </p:extLst>
   </p:cSld>
@@ -2641,15 +2641,15 @@
         </p:nvSpPr>
         <p:spPr>
           <a:xfrm>
-            <a:off x="839789" y="341418"/>
-            <a:ext cx="3932237" cy="1194964"/>
+            <a:off x="839789" y="298662"/>
+            <a:ext cx="3932237" cy="1045316"/>
           </a:xfrm>
         </p:spPr>
         <p:txBody>
           <a:bodyPr anchor="b"/>
           <a:lstStyle>
             <a:lvl1pPr>
-              <a:defRPr sz="2390"/>
+              <a:defRPr sz="2090"/>
             </a:lvl1pPr>
           </a:lstStyle>
           <a:p>
@@ -2673,39 +2673,39 @@
         </p:nvSpPr>
         <p:spPr>
           <a:xfrm>
-            <a:off x="5183188" y="737369"/>
-            <a:ext cx="6172200" cy="3639425"/>
+            <a:off x="5183188" y="645027"/>
+            <a:ext cx="6172200" cy="3183650"/>
           </a:xfrm>
         </p:spPr>
         <p:txBody>
           <a:bodyPr/>
           <a:lstStyle>
             <a:lvl1pPr>
-              <a:defRPr sz="2390"/>
+              <a:defRPr sz="2090"/>
             </a:lvl1pPr>
             <a:lvl2pPr>
-              <a:defRPr sz="2091"/>
+              <a:defRPr sz="1829"/>
             </a:lvl2pPr>
             <a:lvl3pPr>
-              <a:defRPr sz="1792"/>
+              <a:defRPr sz="1568"/>
             </a:lvl3pPr>
             <a:lvl4pPr>
-              <a:defRPr sz="1494"/>
+              <a:defRPr sz="1306"/>
             </a:lvl4pPr>
             <a:lvl5pPr>
-              <a:defRPr sz="1494"/>
+              <a:defRPr sz="1306"/>
             </a:lvl5pPr>
             <a:lvl6pPr>
-              <a:defRPr sz="1494"/>
+              <a:defRPr sz="1306"/>
             </a:lvl6pPr>
             <a:lvl7pPr>
-              <a:defRPr sz="1494"/>
+              <a:defRPr sz="1306"/>
             </a:lvl7pPr>
             <a:lvl8pPr>
-              <a:defRPr sz="1494"/>
+              <a:defRPr sz="1306"/>
             </a:lvl8pPr>
             <a:lvl9pPr>
-              <a:defRPr sz="1494"/>
+              <a:defRPr sz="1306"/>
             </a:lvl9pPr>
           </a:lstStyle>
           <a:p>
@@ -2758,8 +2758,8 @@
         </p:nvSpPr>
         <p:spPr>
           <a:xfrm>
-            <a:off x="839789" y="1536382"/>
-            <a:ext cx="3932237" cy="2846339"/>
+            <a:off x="839789" y="1343977"/>
+            <a:ext cx="3932237" cy="2489885"/>
           </a:xfrm>
         </p:spPr>
         <p:txBody>
@@ -2767,39 +2767,39 @@
           <a:lstStyle>
             <a:lvl1pPr marL="0" indent="0">
               <a:buNone/>
-              <a:defRPr sz="1195"/>
+              <a:defRPr sz="1045"/>
             </a:lvl1pPr>
-            <a:lvl2pPr marL="341437" indent="0">
+            <a:lvl2pPr marL="298643" indent="0">
               <a:buNone/>
-              <a:defRPr sz="1046"/>
+              <a:defRPr sz="914"/>
             </a:lvl2pPr>
-            <a:lvl3pPr marL="682874" indent="0">
+            <a:lvl3pPr marL="597286" indent="0">
               <a:buNone/>
-              <a:defRPr sz="896"/>
+              <a:defRPr sz="784"/>
             </a:lvl3pPr>
-            <a:lvl4pPr marL="1024311" indent="0">
+            <a:lvl4pPr marL="895929" indent="0">
               <a:buNone/>
-              <a:defRPr sz="747"/>
+              <a:defRPr sz="653"/>
             </a:lvl4pPr>
-            <a:lvl5pPr marL="1365748" indent="0">
+            <a:lvl5pPr marL="1194572" indent="0">
               <a:buNone/>
-              <a:defRPr sz="747"/>
+              <a:defRPr sz="653"/>
             </a:lvl5pPr>
-            <a:lvl6pPr marL="1707185" indent="0">
+            <a:lvl6pPr marL="1493215" indent="0">
               <a:buNone/>
-              <a:defRPr sz="747"/>
+              <a:defRPr sz="653"/>
             </a:lvl6pPr>
-            <a:lvl7pPr marL="2048622" indent="0">
+            <a:lvl7pPr marL="1791858" indent="0">
               <a:buNone/>
-              <a:defRPr sz="747"/>
+              <a:defRPr sz="653"/>
             </a:lvl7pPr>
-            <a:lvl8pPr marL="2390059" indent="0">
+            <a:lvl8pPr marL="2090501" indent="0">
               <a:buNone/>
-              <a:defRPr sz="747"/>
+              <a:defRPr sz="653"/>
             </a:lvl8pPr>
-            <a:lvl9pPr marL="2731496" indent="0">
+            <a:lvl9pPr marL="2389144" indent="0">
               <a:buNone/>
-              <a:defRPr sz="747"/>
+              <a:defRPr sz="653"/>
             </a:lvl9pPr>
           </a:lstStyle>
           <a:p>
@@ -2835,7 +2835,7 @@
                 </a:solidFill>
               </a:rPr>
               <a:pPr/>
-              <a:t>4.12.2017</a:t>
+              <a:t>5.12.2017</a:t>
             </a:fld>
             <a:endParaRPr lang="fi-FI">
               <a:solidFill>
@@ -2911,7 +2911,7 @@
     </p:spTree>
     <p:extLst>
       <p:ext uri="{BB962C8B-B14F-4D97-AF65-F5344CB8AC3E}">
-        <p14:creationId xmlns:p14="http://schemas.microsoft.com/office/powerpoint/2010/main" val="2250363931"/>
+        <p14:creationId xmlns:p14="http://schemas.microsoft.com/office/powerpoint/2010/main" val="2892054573"/>
       </p:ext>
     </p:extLst>
   </p:cSld>
@@ -2950,15 +2950,15 @@
         </p:nvSpPr>
         <p:spPr>
           <a:xfrm>
-            <a:off x="839789" y="341418"/>
-            <a:ext cx="3932237" cy="1194964"/>
+            <a:off x="839789" y="298662"/>
+            <a:ext cx="3932237" cy="1045316"/>
           </a:xfrm>
         </p:spPr>
         <p:txBody>
           <a:bodyPr anchor="b"/>
           <a:lstStyle>
             <a:lvl1pPr>
-              <a:defRPr sz="2390"/>
+              <a:defRPr sz="2090"/>
             </a:lvl1pPr>
           </a:lstStyle>
           <a:p>
@@ -2982,8 +2982,8 @@
         </p:nvSpPr>
         <p:spPr>
           <a:xfrm>
-            <a:off x="5183188" y="737369"/>
-            <a:ext cx="6172200" cy="3639425"/>
+            <a:off x="5183188" y="645027"/>
+            <a:ext cx="6172200" cy="3183650"/>
           </a:xfrm>
         </p:spPr>
         <p:txBody>
@@ -2991,39 +2991,39 @@
           <a:lstStyle>
             <a:lvl1pPr marL="0" indent="0">
               <a:buNone/>
-              <a:defRPr sz="2390"/>
+              <a:defRPr sz="2090"/>
             </a:lvl1pPr>
-            <a:lvl2pPr marL="341437" indent="0">
+            <a:lvl2pPr marL="298643" indent="0">
               <a:buNone/>
-              <a:defRPr sz="2091"/>
+              <a:defRPr sz="1829"/>
             </a:lvl2pPr>
-            <a:lvl3pPr marL="682874" indent="0">
+            <a:lvl3pPr marL="597286" indent="0">
               <a:buNone/>
-              <a:defRPr sz="1792"/>
+              <a:defRPr sz="1568"/>
             </a:lvl3pPr>
-            <a:lvl4pPr marL="1024311" indent="0">
+            <a:lvl4pPr marL="895929" indent="0">
               <a:buNone/>
-              <a:defRPr sz="1494"/>
+              <a:defRPr sz="1306"/>
             </a:lvl4pPr>
-            <a:lvl5pPr marL="1365748" indent="0">
+            <a:lvl5pPr marL="1194572" indent="0">
               <a:buNone/>
-              <a:defRPr sz="1494"/>
+              <a:defRPr sz="1306"/>
             </a:lvl5pPr>
-            <a:lvl6pPr marL="1707185" indent="0">
+            <a:lvl6pPr marL="1493215" indent="0">
               <a:buNone/>
-              <a:defRPr sz="1494"/>
+              <a:defRPr sz="1306"/>
             </a:lvl6pPr>
-            <a:lvl7pPr marL="2048622" indent="0">
+            <a:lvl7pPr marL="1791858" indent="0">
               <a:buNone/>
-              <a:defRPr sz="1494"/>
+              <a:defRPr sz="1306"/>
             </a:lvl7pPr>
-            <a:lvl8pPr marL="2390059" indent="0">
+            <a:lvl8pPr marL="2090501" indent="0">
               <a:buNone/>
-              <a:defRPr sz="1494"/>
+              <a:defRPr sz="1306"/>
             </a:lvl8pPr>
-            <a:lvl9pPr marL="2731496" indent="0">
+            <a:lvl9pPr marL="2389144" indent="0">
               <a:buNone/>
-              <a:defRPr sz="1494"/>
+              <a:defRPr sz="1306"/>
             </a:lvl9pPr>
           </a:lstStyle>
           <a:p>
@@ -3047,8 +3047,8 @@
         </p:nvSpPr>
         <p:spPr>
           <a:xfrm>
-            <a:off x="839789" y="1536382"/>
-            <a:ext cx="3932237" cy="2846339"/>
+            <a:off x="839789" y="1343977"/>
+            <a:ext cx="3932237" cy="2489885"/>
           </a:xfrm>
         </p:spPr>
         <p:txBody>
@@ -3056,39 +3056,39 @@
           <a:lstStyle>
             <a:lvl1pPr marL="0" indent="0">
               <a:buNone/>
-              <a:defRPr sz="1195"/>
+              <a:defRPr sz="1045"/>
             </a:lvl1pPr>
-            <a:lvl2pPr marL="341437" indent="0">
+            <a:lvl2pPr marL="298643" indent="0">
               <a:buNone/>
-              <a:defRPr sz="1046"/>
+              <a:defRPr sz="914"/>
             </a:lvl2pPr>
-            <a:lvl3pPr marL="682874" indent="0">
+            <a:lvl3pPr marL="597286" indent="0">
               <a:buNone/>
-              <a:defRPr sz="896"/>
+              <a:defRPr sz="784"/>
             </a:lvl3pPr>
-            <a:lvl4pPr marL="1024311" indent="0">
+            <a:lvl4pPr marL="895929" indent="0">
               <a:buNone/>
-              <a:defRPr sz="747"/>
+              <a:defRPr sz="653"/>
             </a:lvl4pPr>
-            <a:lvl5pPr marL="1365748" indent="0">
+            <a:lvl5pPr marL="1194572" indent="0">
               <a:buNone/>
-              <a:defRPr sz="747"/>
+              <a:defRPr sz="653"/>
             </a:lvl5pPr>
-            <a:lvl6pPr marL="1707185" indent="0">
+            <a:lvl6pPr marL="1493215" indent="0">
               <a:buNone/>
-              <a:defRPr sz="747"/>
+              <a:defRPr sz="653"/>
             </a:lvl6pPr>
-            <a:lvl7pPr marL="2048622" indent="0">
+            <a:lvl7pPr marL="1791858" indent="0">
               <a:buNone/>
-              <a:defRPr sz="747"/>
+              <a:defRPr sz="653"/>
             </a:lvl7pPr>
-            <a:lvl8pPr marL="2390059" indent="0">
+            <a:lvl8pPr marL="2090501" indent="0">
               <a:buNone/>
-              <a:defRPr sz="747"/>
+              <a:defRPr sz="653"/>
             </a:lvl8pPr>
-            <a:lvl9pPr marL="2731496" indent="0">
+            <a:lvl9pPr marL="2389144" indent="0">
               <a:buNone/>
-              <a:defRPr sz="747"/>
+              <a:defRPr sz="653"/>
             </a:lvl9pPr>
           </a:lstStyle>
           <a:p>
@@ -3124,7 +3124,7 @@
                 </a:solidFill>
               </a:rPr>
               <a:pPr/>
-              <a:t>4.12.2017</a:t>
+              <a:t>5.12.2017</a:t>
             </a:fld>
             <a:endParaRPr lang="fi-FI">
               <a:solidFill>
@@ -3200,7 +3200,7 @@
     </p:spTree>
     <p:extLst>
       <p:ext uri="{BB962C8B-B14F-4D97-AF65-F5344CB8AC3E}">
-        <p14:creationId xmlns:p14="http://schemas.microsoft.com/office/powerpoint/2010/main" val="820841973"/>
+        <p14:creationId xmlns:p14="http://schemas.microsoft.com/office/powerpoint/2010/main" val="3567814450"/>
       </p:ext>
     </p:extLst>
   </p:cSld>
@@ -3244,8 +3244,8 @@
         </p:nvSpPr>
         <p:spPr>
           <a:xfrm>
-            <a:off x="838200" y="272661"/>
-            <a:ext cx="10515600" cy="989876"/>
+            <a:off x="838200" y="238515"/>
+            <a:ext cx="10515600" cy="865912"/>
           </a:xfrm>
           <a:prstGeom prst="rect">
             <a:avLst/>
@@ -3277,8 +3277,8 @@
         </p:nvSpPr>
         <p:spPr>
           <a:xfrm>
-            <a:off x="838200" y="1363302"/>
-            <a:ext cx="10515600" cy="3249402"/>
+            <a:off x="838200" y="1192573"/>
+            <a:ext cx="10515600" cy="2842471"/>
           </a:xfrm>
           <a:prstGeom prst="rect">
             <a:avLst/>
@@ -3339,8 +3339,8 @@
         </p:nvSpPr>
         <p:spPr>
           <a:xfrm>
-            <a:off x="838200" y="4746664"/>
-            <a:ext cx="2743200" cy="272660"/>
+            <a:off x="838200" y="4152227"/>
+            <a:ext cx="2743200" cy="238515"/>
           </a:xfrm>
           <a:prstGeom prst="rect">
             <a:avLst/>
@@ -3350,7 +3350,7 @@
           <a:bodyPr vert="horz" lIns="91440" tIns="45720" rIns="91440" bIns="45720" rtlCol="0" anchor="ctr"/>
           <a:lstStyle>
             <a:lvl1pPr algn="l">
-              <a:defRPr sz="896">
+              <a:defRPr sz="784">
                 <a:solidFill>
                   <a:schemeClr val="tx1">
                     <a:tint val="75000"/>
@@ -3369,7 +3369,7 @@
                 </a:solidFill>
               </a:rPr>
               <a:pPr/>
-              <a:t>4.12.2017</a:t>
+              <a:t>5.12.2017</a:t>
             </a:fld>
             <a:endParaRPr lang="fi-FI">
               <a:solidFill>
@@ -3393,8 +3393,8 @@
         </p:nvSpPr>
         <p:spPr>
           <a:xfrm>
-            <a:off x="4038600" y="4746664"/>
-            <a:ext cx="4114800" cy="272660"/>
+            <a:off x="4038600" y="4152227"/>
+            <a:ext cx="4114800" cy="238515"/>
           </a:xfrm>
           <a:prstGeom prst="rect">
             <a:avLst/>
@@ -3404,7 +3404,7 @@
           <a:bodyPr vert="horz" lIns="91440" tIns="45720" rIns="91440" bIns="45720" rtlCol="0" anchor="ctr"/>
           <a:lstStyle>
             <a:lvl1pPr algn="ctr">
-              <a:defRPr sz="896">
+              <a:defRPr sz="784">
                 <a:solidFill>
                   <a:schemeClr val="tx1">
                     <a:tint val="75000"/>
@@ -3436,8 +3436,8 @@
         </p:nvSpPr>
         <p:spPr>
           <a:xfrm>
-            <a:off x="8610600" y="4746664"/>
-            <a:ext cx="2743200" cy="272660"/>
+            <a:off x="8610600" y="4152227"/>
+            <a:ext cx="2743200" cy="238515"/>
           </a:xfrm>
           <a:prstGeom prst="rect">
             <a:avLst/>
@@ -3447,7 +3447,7 @@
           <a:bodyPr vert="horz" lIns="91440" tIns="45720" rIns="91440" bIns="45720" rtlCol="0" anchor="ctr"/>
           <a:lstStyle>
             <a:lvl1pPr algn="r">
-              <a:defRPr sz="896">
+              <a:defRPr sz="784">
                 <a:solidFill>
                   <a:schemeClr val="tx1">
                     <a:tint val="75000"/>
@@ -3481,27 +3481,27 @@
     </p:spTree>
     <p:extLst>
       <p:ext uri="{BB962C8B-B14F-4D97-AF65-F5344CB8AC3E}">
-        <p14:creationId xmlns:p14="http://schemas.microsoft.com/office/powerpoint/2010/main" val="2504945103"/>
+        <p14:creationId xmlns:p14="http://schemas.microsoft.com/office/powerpoint/2010/main" val="2087370705"/>
       </p:ext>
     </p:extLst>
   </p:cSld>
   <p:clrMap bg1="lt1" tx1="dk1" bg2="lt2" tx2="dk2" accent1="accent1" accent2="accent2" accent3="accent3" accent4="accent4" accent5="accent5" accent6="accent6" hlink="hlink" folHlink="folHlink"/>
   <p:sldLayoutIdLst>
-    <p:sldLayoutId id="2147483673" r:id="rId1"/>
-    <p:sldLayoutId id="2147483674" r:id="rId2"/>
-    <p:sldLayoutId id="2147483675" r:id="rId3"/>
-    <p:sldLayoutId id="2147483676" r:id="rId4"/>
-    <p:sldLayoutId id="2147483677" r:id="rId5"/>
-    <p:sldLayoutId id="2147483678" r:id="rId6"/>
-    <p:sldLayoutId id="2147483679" r:id="rId7"/>
-    <p:sldLayoutId id="2147483680" r:id="rId8"/>
-    <p:sldLayoutId id="2147483681" r:id="rId9"/>
-    <p:sldLayoutId id="2147483682" r:id="rId10"/>
-    <p:sldLayoutId id="2147483683" r:id="rId11"/>
+    <p:sldLayoutId id="2147483709" r:id="rId1"/>
+    <p:sldLayoutId id="2147483710" r:id="rId2"/>
+    <p:sldLayoutId id="2147483711" r:id="rId3"/>
+    <p:sldLayoutId id="2147483712" r:id="rId4"/>
+    <p:sldLayoutId id="2147483713" r:id="rId5"/>
+    <p:sldLayoutId id="2147483714" r:id="rId6"/>
+    <p:sldLayoutId id="2147483715" r:id="rId7"/>
+    <p:sldLayoutId id="2147483716" r:id="rId8"/>
+    <p:sldLayoutId id="2147483717" r:id="rId9"/>
+    <p:sldLayoutId id="2147483718" r:id="rId10"/>
+    <p:sldLayoutId id="2147483719" r:id="rId11"/>
   </p:sldLayoutIdLst>
   <p:txStyles>
     <p:titleStyle>
-      <a:lvl1pPr algn="l" defTabSz="682874" rtl="0" eaLnBrk="1" latinLnBrk="0" hangingPunct="1">
+      <a:lvl1pPr algn="l" defTabSz="597286" rtl="0" eaLnBrk="1" latinLnBrk="0" hangingPunct="1">
         <a:lnSpc>
           <a:spcPct val="90000"/>
         </a:lnSpc>
@@ -3509,7 +3509,7 @@
           <a:spcPct val="0"/>
         </a:spcBef>
         <a:buNone/>
-        <a:defRPr sz="3286" kern="1200">
+        <a:defRPr sz="2874" kern="1200">
           <a:solidFill>
             <a:schemeClr val="tx1"/>
           </a:solidFill>
@@ -3520,16 +3520,16 @@
       </a:lvl1pPr>
     </p:titleStyle>
     <p:bodyStyle>
-      <a:lvl1pPr marL="170718" indent="-170718" algn="l" defTabSz="682874" rtl="0" eaLnBrk="1" latinLnBrk="0" hangingPunct="1">
+      <a:lvl1pPr marL="149322" indent="-149322" algn="l" defTabSz="597286" rtl="0" eaLnBrk="1" latinLnBrk="0" hangingPunct="1">
         <a:lnSpc>
           <a:spcPct val="90000"/>
         </a:lnSpc>
         <a:spcBef>
-          <a:spcPts val="747"/>
+          <a:spcPts val="653"/>
         </a:spcBef>
         <a:buFont typeface="Arial" panose="020B0604020202020204" pitchFamily="34" charset="0"/>
         <a:buChar char="•"/>
-        <a:defRPr sz="2091" kern="1200">
+        <a:defRPr sz="1829" kern="1200">
           <a:solidFill>
             <a:schemeClr val="tx1"/>
           </a:solidFill>
@@ -3538,16 +3538,16 @@
           <a:cs typeface="+mn-cs"/>
         </a:defRPr>
       </a:lvl1pPr>
-      <a:lvl2pPr marL="512155" indent="-170718" algn="l" defTabSz="682874" rtl="0" eaLnBrk="1" latinLnBrk="0" hangingPunct="1">
+      <a:lvl2pPr marL="447965" indent="-149322" algn="l" defTabSz="597286" rtl="0" eaLnBrk="1" latinLnBrk="0" hangingPunct="1">
         <a:lnSpc>
           <a:spcPct val="90000"/>
         </a:lnSpc>
         <a:spcBef>
-          <a:spcPts val="373"/>
+          <a:spcPts val="327"/>
         </a:spcBef>
         <a:buFont typeface="Arial" panose="020B0604020202020204" pitchFamily="34" charset="0"/>
         <a:buChar char="•"/>
-        <a:defRPr sz="1792" kern="1200">
+        <a:defRPr sz="1568" kern="1200">
           <a:solidFill>
             <a:schemeClr val="tx1"/>
           </a:solidFill>
@@ -3556,16 +3556,16 @@
           <a:cs typeface="+mn-cs"/>
         </a:defRPr>
       </a:lvl2pPr>
-      <a:lvl3pPr marL="853592" indent="-170718" algn="l" defTabSz="682874" rtl="0" eaLnBrk="1" latinLnBrk="0" hangingPunct="1">
+      <a:lvl3pPr marL="746608" indent="-149322" algn="l" defTabSz="597286" rtl="0" eaLnBrk="1" latinLnBrk="0" hangingPunct="1">
         <a:lnSpc>
           <a:spcPct val="90000"/>
         </a:lnSpc>
         <a:spcBef>
-          <a:spcPts val="373"/>
+          <a:spcPts val="327"/>
         </a:spcBef>
         <a:buFont typeface="Arial" panose="020B0604020202020204" pitchFamily="34" charset="0"/>
         <a:buChar char="•"/>
-        <a:defRPr sz="1494" kern="1200">
+        <a:defRPr sz="1306" kern="1200">
           <a:solidFill>
             <a:schemeClr val="tx1"/>
           </a:solidFill>
@@ -3574,16 +3574,16 @@
           <a:cs typeface="+mn-cs"/>
         </a:defRPr>
       </a:lvl3pPr>
-      <a:lvl4pPr marL="1195029" indent="-170718" algn="l" defTabSz="682874" rtl="0" eaLnBrk="1" latinLnBrk="0" hangingPunct="1">
+      <a:lvl4pPr marL="1045251" indent="-149322" algn="l" defTabSz="597286" rtl="0" eaLnBrk="1" latinLnBrk="0" hangingPunct="1">
         <a:lnSpc>
           <a:spcPct val="90000"/>
         </a:lnSpc>
         <a:spcBef>
-          <a:spcPts val="373"/>
+          <a:spcPts val="327"/>
         </a:spcBef>
         <a:buFont typeface="Arial" panose="020B0604020202020204" pitchFamily="34" charset="0"/>
         <a:buChar char="•"/>
-        <a:defRPr sz="1344" kern="1200">
+        <a:defRPr sz="1176" kern="1200">
           <a:solidFill>
             <a:schemeClr val="tx1"/>
           </a:solidFill>
@@ -3592,16 +3592,16 @@
           <a:cs typeface="+mn-cs"/>
         </a:defRPr>
       </a:lvl4pPr>
-      <a:lvl5pPr marL="1536466" indent="-170718" algn="l" defTabSz="682874" rtl="0" eaLnBrk="1" latinLnBrk="0" hangingPunct="1">
+      <a:lvl5pPr marL="1343894" indent="-149322" algn="l" defTabSz="597286" rtl="0" eaLnBrk="1" latinLnBrk="0" hangingPunct="1">
         <a:lnSpc>
           <a:spcPct val="90000"/>
         </a:lnSpc>
         <a:spcBef>
-          <a:spcPts val="373"/>
+          <a:spcPts val="327"/>
         </a:spcBef>
         <a:buFont typeface="Arial" panose="020B0604020202020204" pitchFamily="34" charset="0"/>
         <a:buChar char="•"/>
-        <a:defRPr sz="1344" kern="1200">
+        <a:defRPr sz="1176" kern="1200">
           <a:solidFill>
             <a:schemeClr val="tx1"/>
           </a:solidFill>
@@ -3610,16 +3610,16 @@
           <a:cs typeface="+mn-cs"/>
         </a:defRPr>
       </a:lvl5pPr>
-      <a:lvl6pPr marL="1877903" indent="-170718" algn="l" defTabSz="682874" rtl="0" eaLnBrk="1" latinLnBrk="0" hangingPunct="1">
+      <a:lvl6pPr marL="1642537" indent="-149322" algn="l" defTabSz="597286" rtl="0" eaLnBrk="1" latinLnBrk="0" hangingPunct="1">
         <a:lnSpc>
           <a:spcPct val="90000"/>
         </a:lnSpc>
         <a:spcBef>
-          <a:spcPts val="373"/>
+          <a:spcPts val="327"/>
         </a:spcBef>
         <a:buFont typeface="Arial" panose="020B0604020202020204" pitchFamily="34" charset="0"/>
         <a:buChar char="•"/>
-        <a:defRPr sz="1344" kern="1200">
+        <a:defRPr sz="1176" kern="1200">
           <a:solidFill>
             <a:schemeClr val="tx1"/>
           </a:solidFill>
@@ -3628,16 +3628,16 @@
           <a:cs typeface="+mn-cs"/>
         </a:defRPr>
       </a:lvl6pPr>
-      <a:lvl7pPr marL="2219340" indent="-170718" algn="l" defTabSz="682874" rtl="0" eaLnBrk="1" latinLnBrk="0" hangingPunct="1">
+      <a:lvl7pPr marL="1941180" indent="-149322" algn="l" defTabSz="597286" rtl="0" eaLnBrk="1" latinLnBrk="0" hangingPunct="1">
         <a:lnSpc>
           <a:spcPct val="90000"/>
         </a:lnSpc>
         <a:spcBef>
-          <a:spcPts val="373"/>
+          <a:spcPts val="327"/>
         </a:spcBef>
         <a:buFont typeface="Arial" panose="020B0604020202020204" pitchFamily="34" charset="0"/>
         <a:buChar char="•"/>
-        <a:defRPr sz="1344" kern="1200">
+        <a:defRPr sz="1176" kern="1200">
           <a:solidFill>
             <a:schemeClr val="tx1"/>
           </a:solidFill>
@@ -3646,16 +3646,16 @@
           <a:cs typeface="+mn-cs"/>
         </a:defRPr>
       </a:lvl7pPr>
-      <a:lvl8pPr marL="2560777" indent="-170718" algn="l" defTabSz="682874" rtl="0" eaLnBrk="1" latinLnBrk="0" hangingPunct="1">
+      <a:lvl8pPr marL="2239823" indent="-149322" algn="l" defTabSz="597286" rtl="0" eaLnBrk="1" latinLnBrk="0" hangingPunct="1">
         <a:lnSpc>
           <a:spcPct val="90000"/>
         </a:lnSpc>
         <a:spcBef>
-          <a:spcPts val="373"/>
+          <a:spcPts val="327"/>
         </a:spcBef>
         <a:buFont typeface="Arial" panose="020B0604020202020204" pitchFamily="34" charset="0"/>
         <a:buChar char="•"/>
-        <a:defRPr sz="1344" kern="1200">
+        <a:defRPr sz="1176" kern="1200">
           <a:solidFill>
             <a:schemeClr val="tx1"/>
           </a:solidFill>
@@ -3664,16 +3664,16 @@
           <a:cs typeface="+mn-cs"/>
         </a:defRPr>
       </a:lvl8pPr>
-      <a:lvl9pPr marL="2902214" indent="-170718" algn="l" defTabSz="682874" rtl="0" eaLnBrk="1" latinLnBrk="0" hangingPunct="1">
+      <a:lvl9pPr marL="2538466" indent="-149322" algn="l" defTabSz="597286" rtl="0" eaLnBrk="1" latinLnBrk="0" hangingPunct="1">
         <a:lnSpc>
           <a:spcPct val="90000"/>
         </a:lnSpc>
         <a:spcBef>
-          <a:spcPts val="373"/>
+          <a:spcPts val="327"/>
         </a:spcBef>
         <a:buFont typeface="Arial" panose="020B0604020202020204" pitchFamily="34" charset="0"/>
         <a:buChar char="•"/>
-        <a:defRPr sz="1344" kern="1200">
+        <a:defRPr sz="1176" kern="1200">
           <a:solidFill>
             <a:schemeClr val="tx1"/>
           </a:solidFill>
@@ -3687,8 +3687,8 @@
       <a:defPPr>
         <a:defRPr lang="en-US"/>
       </a:defPPr>
-      <a:lvl1pPr marL="0" algn="l" defTabSz="682874" rtl="0" eaLnBrk="1" latinLnBrk="0" hangingPunct="1">
-        <a:defRPr sz="1344" kern="1200">
+      <a:lvl1pPr marL="0" algn="l" defTabSz="597286" rtl="0" eaLnBrk="1" latinLnBrk="0" hangingPunct="1">
+        <a:defRPr sz="1176" kern="1200">
           <a:solidFill>
             <a:schemeClr val="tx1"/>
           </a:solidFill>
@@ -3697,8 +3697,8 @@
           <a:cs typeface="+mn-cs"/>
         </a:defRPr>
       </a:lvl1pPr>
-      <a:lvl2pPr marL="341437" algn="l" defTabSz="682874" rtl="0" eaLnBrk="1" latinLnBrk="0" hangingPunct="1">
-        <a:defRPr sz="1344" kern="1200">
+      <a:lvl2pPr marL="298643" algn="l" defTabSz="597286" rtl="0" eaLnBrk="1" latinLnBrk="0" hangingPunct="1">
+        <a:defRPr sz="1176" kern="1200">
           <a:solidFill>
             <a:schemeClr val="tx1"/>
           </a:solidFill>
@@ -3707,8 +3707,8 @@
           <a:cs typeface="+mn-cs"/>
         </a:defRPr>
       </a:lvl2pPr>
-      <a:lvl3pPr marL="682874" algn="l" defTabSz="682874" rtl="0" eaLnBrk="1" latinLnBrk="0" hangingPunct="1">
-        <a:defRPr sz="1344" kern="1200">
+      <a:lvl3pPr marL="597286" algn="l" defTabSz="597286" rtl="0" eaLnBrk="1" latinLnBrk="0" hangingPunct="1">
+        <a:defRPr sz="1176" kern="1200">
           <a:solidFill>
             <a:schemeClr val="tx1"/>
           </a:solidFill>
@@ -3717,8 +3717,8 @@
           <a:cs typeface="+mn-cs"/>
         </a:defRPr>
       </a:lvl3pPr>
-      <a:lvl4pPr marL="1024311" algn="l" defTabSz="682874" rtl="0" eaLnBrk="1" latinLnBrk="0" hangingPunct="1">
-        <a:defRPr sz="1344" kern="1200">
+      <a:lvl4pPr marL="895929" algn="l" defTabSz="597286" rtl="0" eaLnBrk="1" latinLnBrk="0" hangingPunct="1">
+        <a:defRPr sz="1176" kern="1200">
           <a:solidFill>
             <a:schemeClr val="tx1"/>
           </a:solidFill>
@@ -3727,8 +3727,8 @@
           <a:cs typeface="+mn-cs"/>
         </a:defRPr>
       </a:lvl4pPr>
-      <a:lvl5pPr marL="1365748" algn="l" defTabSz="682874" rtl="0" eaLnBrk="1" latinLnBrk="0" hangingPunct="1">
-        <a:defRPr sz="1344" kern="1200">
+      <a:lvl5pPr marL="1194572" algn="l" defTabSz="597286" rtl="0" eaLnBrk="1" latinLnBrk="0" hangingPunct="1">
+        <a:defRPr sz="1176" kern="1200">
           <a:solidFill>
             <a:schemeClr val="tx1"/>
           </a:solidFill>
@@ -3737,8 +3737,8 @@
           <a:cs typeface="+mn-cs"/>
         </a:defRPr>
       </a:lvl5pPr>
-      <a:lvl6pPr marL="1707185" algn="l" defTabSz="682874" rtl="0" eaLnBrk="1" latinLnBrk="0" hangingPunct="1">
-        <a:defRPr sz="1344" kern="1200">
+      <a:lvl6pPr marL="1493215" algn="l" defTabSz="597286" rtl="0" eaLnBrk="1" latinLnBrk="0" hangingPunct="1">
+        <a:defRPr sz="1176" kern="1200">
           <a:solidFill>
             <a:schemeClr val="tx1"/>
           </a:solidFill>
@@ -3747,8 +3747,8 @@
           <a:cs typeface="+mn-cs"/>
         </a:defRPr>
       </a:lvl6pPr>
-      <a:lvl7pPr marL="2048622" algn="l" defTabSz="682874" rtl="0" eaLnBrk="1" latinLnBrk="0" hangingPunct="1">
-        <a:defRPr sz="1344" kern="1200">
+      <a:lvl7pPr marL="1791858" algn="l" defTabSz="597286" rtl="0" eaLnBrk="1" latinLnBrk="0" hangingPunct="1">
+        <a:defRPr sz="1176" kern="1200">
           <a:solidFill>
             <a:schemeClr val="tx1"/>
           </a:solidFill>
@@ -3757,8 +3757,8 @@
           <a:cs typeface="+mn-cs"/>
         </a:defRPr>
       </a:lvl7pPr>
-      <a:lvl8pPr marL="2390059" algn="l" defTabSz="682874" rtl="0" eaLnBrk="1" latinLnBrk="0" hangingPunct="1">
-        <a:defRPr sz="1344" kern="1200">
+      <a:lvl8pPr marL="2090501" algn="l" defTabSz="597286" rtl="0" eaLnBrk="1" latinLnBrk="0" hangingPunct="1">
+        <a:defRPr sz="1176" kern="1200">
           <a:solidFill>
             <a:schemeClr val="tx1"/>
           </a:solidFill>
@@ -3767,8 +3767,8 @@
           <a:cs typeface="+mn-cs"/>
         </a:defRPr>
       </a:lvl8pPr>
-      <a:lvl9pPr marL="2731496" algn="l" defTabSz="682874" rtl="0" eaLnBrk="1" latinLnBrk="0" hangingPunct="1">
-        <a:defRPr sz="1344" kern="1200">
+      <a:lvl9pPr marL="2389144" algn="l" defTabSz="597286" rtl="0" eaLnBrk="1" latinLnBrk="0" hangingPunct="1">
+        <a:defRPr sz="1176" kern="1200">
           <a:solidFill>
             <a:schemeClr val="tx1"/>
           </a:solidFill>
@@ -3807,7 +3807,7 @@
         </p:nvSpPr>
         <p:spPr bwMode="auto">
           <a:xfrm>
-            <a:off x="3896811" y="1126995"/>
+            <a:off x="3896814" y="863473"/>
             <a:ext cx="3718231" cy="3175745"/>
           </a:xfrm>
           <a:prstGeom prst="roundRect">
@@ -3962,7 +3962,7 @@
         </p:nvSpPr>
         <p:spPr bwMode="auto">
           <a:xfrm>
-            <a:off x="9514303" y="1126995"/>
+            <a:off x="9514303" y="863473"/>
             <a:ext cx="2256164" cy="3175745"/>
           </a:xfrm>
           <a:prstGeom prst="roundRect">
@@ -4134,7 +4134,7 @@
         </p:nvSpPr>
         <p:spPr bwMode="auto">
           <a:xfrm>
-            <a:off x="9615483" y="3086738"/>
+            <a:off x="9615486" y="2823213"/>
             <a:ext cx="1037771" cy="1099636"/>
           </a:xfrm>
           <a:prstGeom prst="roundRect">
@@ -4297,7 +4297,7 @@
         </p:nvSpPr>
         <p:spPr bwMode="auto">
           <a:xfrm>
-            <a:off x="181048" y="2841242"/>
+            <a:off x="181048" y="2577720"/>
             <a:ext cx="1937670" cy="815259"/>
           </a:xfrm>
           <a:prstGeom prst="roundRect">
@@ -4451,17 +4451,7 @@
                 <a:ea typeface="HG明朝E" panose="02020909000000000000" pitchFamily="17" charset="-128"/>
                 <a:cs typeface="Arial" pitchFamily="34" charset="0"/>
               </a:rPr>
-              <a:t>WoT </a:t>
-            </a:r>
-            <a:r>
-              <a:rPr lang="en-US" altLang="ja-JP" sz="1455" b="1" kern="0" dirty="0">
-                <a:solidFill>
-                  <a:srgbClr val="000000"/>
-                </a:solidFill>
-                <a:ea typeface="HG明朝E" panose="02020909000000000000" pitchFamily="17" charset="-128"/>
-                <a:cs typeface="Arial" pitchFamily="34" charset="0"/>
-              </a:rPr>
-              <a:t>Client </a:t>
+              <a:t>WoT Client </a:t>
             </a:r>
           </a:p>
           <a:p>
@@ -4489,7 +4479,7 @@
         </p:nvSpPr>
         <p:spPr bwMode="auto">
           <a:xfrm>
-            <a:off x="10750334" y="3086738"/>
+            <a:off x="10750334" y="2823213"/>
             <a:ext cx="915394" cy="1099636"/>
           </a:xfrm>
           <a:prstGeom prst="roundRect">
@@ -4640,7 +4630,7 @@
         </p:nvSpPr>
         <p:spPr>
           <a:xfrm>
-            <a:off x="10867091" y="3465460"/>
+            <a:off x="10867094" y="3201938"/>
             <a:ext cx="680727" cy="628433"/>
           </a:xfrm>
           <a:prstGeom prst="rect">
@@ -4804,7 +4794,7 @@
         </p:nvSpPr>
         <p:spPr bwMode="auto">
           <a:xfrm>
-            <a:off x="9615482" y="1789752"/>
+            <a:off x="9615485" y="1526230"/>
             <a:ext cx="2050247" cy="1203697"/>
           </a:xfrm>
           <a:prstGeom prst="roundRect">
@@ -4953,7 +4943,7 @@
         </p:nvCxnSpPr>
         <p:spPr>
           <a:xfrm>
-            <a:off x="1413383" y="3635154"/>
+            <a:off x="1413383" y="3371632"/>
             <a:ext cx="1569558" cy="541277"/>
           </a:xfrm>
           <a:prstGeom prst="bentConnector3">
@@ -4980,7 +4970,7 @@
         </p:nvCxnSpPr>
         <p:spPr>
           <a:xfrm rot="10800000">
-            <a:off x="1290031" y="3603588"/>
+            <a:off x="1290034" y="3340066"/>
             <a:ext cx="1596489" cy="809103"/>
           </a:xfrm>
           <a:prstGeom prst="bentConnector2">
@@ -5005,7 +4995,7 @@
         </p:nvSpPr>
         <p:spPr>
           <a:xfrm>
-            <a:off x="1448308" y="3861240"/>
+            <a:off x="1448308" y="3597715"/>
             <a:ext cx="1386020" cy="293798"/>
           </a:xfrm>
           <a:prstGeom prst="rect">
@@ -5043,7 +5033,7 @@
         </p:nvSpPr>
         <p:spPr>
           <a:xfrm>
-            <a:off x="1417723" y="4412690"/>
+            <a:off x="1417726" y="4149165"/>
             <a:ext cx="1447191" cy="293798"/>
           </a:xfrm>
           <a:prstGeom prst="rect">
@@ -5081,7 +5071,7 @@
         </p:nvSpPr>
         <p:spPr bwMode="auto">
           <a:xfrm>
-            <a:off x="4001550" y="1505559"/>
+            <a:off x="4001553" y="1242034"/>
             <a:ext cx="3508753" cy="826036"/>
           </a:xfrm>
           <a:prstGeom prst="roundRect">
@@ -5227,7 +5217,7 @@
         </p:nvSpPr>
         <p:spPr bwMode="auto">
           <a:xfrm>
-            <a:off x="4001548" y="3085335"/>
+            <a:off x="4001548" y="2821810"/>
             <a:ext cx="1701818" cy="1099636"/>
           </a:xfrm>
           <a:prstGeom prst="roundRect">
@@ -5389,7 +5379,7 @@
         </p:blipFill>
         <p:spPr>
           <a:xfrm>
-            <a:off x="6736241" y="886136"/>
+            <a:off x="6736244" y="622611"/>
             <a:ext cx="1392035" cy="556814"/>
           </a:xfrm>
           <a:prstGeom prst="rect">
@@ -5405,7 +5395,7 @@
         </p:nvSpPr>
         <p:spPr bwMode="auto">
           <a:xfrm>
-            <a:off x="4001548" y="2206933"/>
+            <a:off x="4001548" y="1943411"/>
             <a:ext cx="3508752" cy="785113"/>
           </a:xfrm>
           <a:prstGeom prst="roundRect">
@@ -5551,7 +5541,7 @@
         </p:nvSpPr>
         <p:spPr bwMode="auto">
           <a:xfrm>
-            <a:off x="4001548" y="2493435"/>
+            <a:off x="4001548" y="2229910"/>
             <a:ext cx="3508752" cy="498610"/>
           </a:xfrm>
           <a:prstGeom prst="roundRect">
@@ -5699,7 +5689,7 @@
         </p:nvSpPr>
         <p:spPr bwMode="auto">
           <a:xfrm>
-            <a:off x="4001550" y="2068643"/>
+            <a:off x="4001553" y="1805121"/>
             <a:ext cx="3508753" cy="418909"/>
           </a:xfrm>
           <a:prstGeom prst="roundRect">
@@ -5848,7 +5838,7 @@
         </p:nvCxnSpPr>
         <p:spPr>
           <a:xfrm rot="16200000" flipV="1">
-            <a:off x="7656461" y="1575030"/>
+            <a:off x="7656461" y="1311505"/>
             <a:ext cx="686318" cy="1283780"/>
           </a:xfrm>
           <a:prstGeom prst="bentConnector2">
@@ -5873,7 +5863,7 @@
         </p:nvCxnSpPr>
         <p:spPr>
           <a:xfrm rot="16200000" flipV="1">
-            <a:off x="7658328" y="1580919"/>
+            <a:off x="7658328" y="1317394"/>
             <a:ext cx="686318" cy="1283780"/>
           </a:xfrm>
           <a:prstGeom prst="bentConnector2">
@@ -5898,7 +5888,7 @@
         </p:nvGrpSpPr>
         <p:grpSpPr>
           <a:xfrm>
-            <a:off x="7900744" y="2560078"/>
+            <a:off x="7900744" y="2296553"/>
             <a:ext cx="1498866" cy="602182"/>
             <a:chOff x="2670082" y="4186219"/>
             <a:chExt cx="2060941" cy="828000"/>
@@ -6639,7 +6629,7 @@
         </p:nvSpPr>
         <p:spPr>
           <a:xfrm rot="5400000">
-            <a:off x="9279335" y="2621795"/>
+            <a:off x="9279335" y="2358273"/>
             <a:ext cx="319732" cy="377429"/>
           </a:xfrm>
           <a:prstGeom prst="downArrow">
@@ -6775,7 +6765,7 @@
         </p:nvSpPr>
         <p:spPr bwMode="auto">
           <a:xfrm>
-            <a:off x="5779087" y="3087405"/>
+            <a:off x="5779087" y="2823880"/>
             <a:ext cx="1701818" cy="1099636"/>
           </a:xfrm>
           <a:prstGeom prst="roundRect">
@@ -6926,7 +6916,7 @@
         </p:nvCxnSpPr>
         <p:spPr>
           <a:xfrm flipV="1">
-            <a:off x="7480905" y="3636556"/>
+            <a:off x="7480905" y="3373031"/>
             <a:ext cx="2134576" cy="666"/>
           </a:xfrm>
           <a:prstGeom prst="bentConnector3">
@@ -6953,7 +6943,7 @@
         </p:nvCxnSpPr>
         <p:spPr>
           <a:xfrm rot="10800000" flipV="1">
-            <a:off x="7450826" y="4001806"/>
+            <a:off x="7450829" y="3738284"/>
             <a:ext cx="2130411" cy="1"/>
           </a:xfrm>
           <a:prstGeom prst="bentConnector3">
@@ -6980,7 +6970,7 @@
         </p:nvSpPr>
         <p:spPr>
           <a:xfrm>
-            <a:off x="7941465" y="3669012"/>
+            <a:off x="7941465" y="3405487"/>
             <a:ext cx="1386020" cy="293798"/>
           </a:xfrm>
           <a:prstGeom prst="rect">
@@ -7018,7 +7008,7 @@
         </p:nvSpPr>
         <p:spPr>
           <a:xfrm>
-            <a:off x="7880144" y="4050669"/>
+            <a:off x="7880147" y="3787144"/>
             <a:ext cx="1447191" cy="293798"/>
           </a:xfrm>
           <a:prstGeom prst="rect">
@@ -7056,7 +7046,7 @@
         </p:nvGrpSpPr>
         <p:grpSpPr>
           <a:xfrm>
-            <a:off x="104482" y="308376"/>
+            <a:off x="104485" y="44851"/>
             <a:ext cx="2190547" cy="1106684"/>
             <a:chOff x="683568" y="79792"/>
             <a:chExt cx="2491222" cy="1700168"/>
@@ -7469,7 +7459,7 @@
         </p:nvSpPr>
         <p:spPr>
           <a:xfrm>
-            <a:off x="271041" y="930021"/>
+            <a:off x="271044" y="666499"/>
             <a:ext cx="1749287" cy="516835"/>
           </a:xfrm>
           <a:prstGeom prst="rect">
@@ -7520,7 +7510,7 @@
         </p:nvCxnSpPr>
         <p:spPr>
           <a:xfrm rot="10800000">
-            <a:off x="2020327" y="1188440"/>
+            <a:off x="2020327" y="924918"/>
             <a:ext cx="1519020" cy="6411"/>
           </a:xfrm>
           <a:prstGeom prst="bentConnector3">
@@ -7550,7 +7540,7 @@
         </p:nvCxnSpPr>
         <p:spPr>
           <a:xfrm rot="16200000" flipH="1">
-            <a:off x="450590" y="2141949"/>
+            <a:off x="450590" y="1878427"/>
             <a:ext cx="1394386" cy="4199"/>
           </a:xfrm>
           <a:prstGeom prst="bentConnector3">
@@ -7578,7 +7568,7 @@
         </p:nvSpPr>
         <p:spPr>
           <a:xfrm>
-            <a:off x="3746090" y="445308"/>
+            <a:off x="3746090" y="181783"/>
             <a:ext cx="8210704" cy="4159046"/>
           </a:xfrm>
           <a:prstGeom prst="rect">
@@ -7625,7 +7615,7 @@
         </p:nvSpPr>
         <p:spPr>
           <a:xfrm>
-            <a:off x="10293896" y="568302"/>
+            <a:off x="10293896" y="304777"/>
             <a:ext cx="1498680" cy="369332"/>
           </a:xfrm>
           <a:prstGeom prst="rect">
@@ -7663,7 +7653,7 @@
         </p:nvGrpSpPr>
         <p:grpSpPr>
           <a:xfrm>
-            <a:off x="520592" y="1802615"/>
+            <a:off x="520595" y="1539090"/>
             <a:ext cx="1302309" cy="596604"/>
             <a:chOff x="2670082" y="4186219"/>
             <a:chExt cx="2060941" cy="828000"/>
@@ -8404,7 +8394,7 @@
         </p:nvSpPr>
         <p:spPr bwMode="auto">
           <a:xfrm rot="16200000">
-            <a:off x="1320508" y="2134927"/>
+            <a:off x="1320508" y="1871405"/>
             <a:ext cx="4136830" cy="757591"/>
           </a:xfrm>
           <a:prstGeom prst="roundRect">
@@ -8560,13 +8550,6 @@
               </a:rPr>
               <a:t>Forwarding proxy</a:t>
             </a:r>
-            <a:endParaRPr lang="en-US" altLang="ja-JP" sz="1455" b="1" kern="0" dirty="0">
-              <a:solidFill>
-                <a:srgbClr val="000000"/>
-              </a:solidFill>
-              <a:ea typeface="HG明朝E" panose="02020909000000000000" pitchFamily="17" charset="-128"/>
-              <a:cs typeface="Arial" pitchFamily="34" charset="0"/>
-            </a:endParaRPr>
           </a:p>
         </p:txBody>
       </p:sp>
@@ -8578,7 +8561,7 @@
         </p:nvGrpSpPr>
         <p:grpSpPr>
           <a:xfrm>
-            <a:off x="2521847" y="840672"/>
+            <a:off x="2521850" y="577147"/>
             <a:ext cx="1302309" cy="596604"/>
             <a:chOff x="2670082" y="4186219"/>
             <a:chExt cx="2060941" cy="828000"/>
@@ -9319,7 +9302,7 @@
         </p:nvSpPr>
         <p:spPr>
           <a:xfrm rot="5400000">
-            <a:off x="3807140" y="916194"/>
+            <a:off x="3807140" y="652672"/>
             <a:ext cx="319732" cy="377429"/>
           </a:xfrm>
           <a:prstGeom prst="downArrow">

</xml_diff>